<commit_message>
few more formatting changes
</commit_message>
<xml_diff>
--- a/Doc/FinalPresentation.pptx
+++ b/Doc/FinalPresentation.pptx
@@ -1236,6 +1236,80 @@
     <p:extLst>
       <p:ext uri="{BB962C8B-B14F-4D97-AF65-F5344CB8AC3E}">
         <p14:creationId xmlns:p14="http://schemas.microsoft.com/office/powerpoint/2010/main" val="2572185844"/>
+      </p:ext>
+    </p:extLst>
+  </p:cSld>
+  <p:clrMapOvr>
+    <a:masterClrMapping/>
+  </p:clrMapOvr>
+</p:notes>
+</file>
+
+<file path=ppt/notesSlides/notesSlide7.xml><?xml version="1.0" encoding="utf-8"?>
+<p:notes xmlns:a="http://schemas.openxmlformats.org/drawingml/2006/main" xmlns:r="http://schemas.openxmlformats.org/officeDocument/2006/relationships" xmlns:p="http://schemas.openxmlformats.org/presentationml/2006/main">
+  <p:cSld>
+    <p:spTree>
+      <p:nvGrpSpPr>
+        <p:cNvPr id="1" name=""/>
+        <p:cNvGrpSpPr/>
+        <p:nvPr/>
+      </p:nvGrpSpPr>
+      <p:grpSpPr>
+        <a:xfrm>
+          <a:off x="0" y="0"/>
+          <a:ext cx="0" cy="0"/>
+          <a:chOff x="0" y="0"/>
+          <a:chExt cx="0" cy="0"/>
+        </a:xfrm>
+      </p:grpSpPr>
+      <p:sp>
+        <p:nvSpPr>
+          <p:cNvPr id="2" name="Slide Image Placeholder 1"/>
+          <p:cNvSpPr>
+            <a:spLocks noGrp="1" noRot="1" noChangeAspect="1"/>
+          </p:cNvSpPr>
+          <p:nvPr>
+            <p:ph type="sldImg"/>
+          </p:nvPr>
+        </p:nvSpPr>
+        <p:spPr>
+          <a:xfrm>
+            <a:off x="381000" y="685800"/>
+            <a:ext cx="6096000" cy="3429000"/>
+          </a:xfrm>
+        </p:spPr>
+      </p:sp>
+      <p:sp>
+        <p:nvSpPr>
+          <p:cNvPr id="3" name="Notes Placeholder 2"/>
+          <p:cNvSpPr>
+            <a:spLocks noGrp="1"/>
+          </p:cNvSpPr>
+          <p:nvPr>
+            <p:ph type="body" idx="1"/>
+          </p:nvPr>
+        </p:nvSpPr>
+        <p:spPr/>
+        <p:txBody>
+          <a:bodyPr/>
+          <a:lstStyle/>
+          <a:p>
+            <a:r>
+              <a:rPr lang="en-US" dirty="0"/>
+              <a:t>Example of our intended user, someone</a:t>
+            </a:r>
+            <a:r>
+              <a:rPr lang="en-US" baseline="0" dirty="0"/>
+              <a:t> interested in technology, but not interested inn spending a lot of time investing</a:t>
+            </a:r>
+            <a:endParaRPr lang="en-US" dirty="0"/>
+          </a:p>
+        </p:txBody>
+      </p:sp>
+    </p:spTree>
+    <p:extLst>
+      <p:ext uri="{BB962C8B-B14F-4D97-AF65-F5344CB8AC3E}">
+        <p14:creationId xmlns:p14="http://schemas.microsoft.com/office/powerpoint/2010/main" val="1063755368"/>
       </p:ext>
     </p:extLst>
   </p:cSld>
@@ -5645,8 +5719,8 @@
         </p:nvSpPr>
         <p:spPr>
           <a:xfrm>
-            <a:off x="2985369" y="2172222"/>
-            <a:ext cx="8229601" cy="1894363"/>
+            <a:off x="2985369" y="2172223"/>
+            <a:ext cx="8229601" cy="1558046"/>
           </a:xfrm>
           <a:prstGeom prst="rect">
             <a:avLst/>
@@ -5661,6 +5735,7 @@
           </a:lstStyle>
           <a:p>
             <a:r>
+              <a:rPr dirty="0"/>
               <a:t>Searching for Success</a:t>
             </a:r>
           </a:p>
@@ -5678,7 +5753,7 @@
         </p:nvSpPr>
         <p:spPr>
           <a:xfrm>
-            <a:off x="3060525" y="3976187"/>
+            <a:off x="3060525" y="3727802"/>
             <a:ext cx="8229601" cy="1371601"/>
           </a:xfrm>
           <a:prstGeom prst="rect">
@@ -5694,7 +5769,16 @@
           </a:lstStyle>
           <a:p>
             <a:r>
-              <a:t>Using google searches to predict the stock market</a:t>
+              <a:rPr dirty="0"/>
+              <a:t>Using google searches to </a:t>
+            </a:r>
+            <a:r>
+              <a:rPr sz="2400" dirty="0"/>
+              <a:t>predict</a:t>
+            </a:r>
+            <a:r>
+              <a:rPr dirty="0"/>
+              <a:t> the stock market</a:t>
             </a:r>
           </a:p>
         </p:txBody>
@@ -5857,7 +5941,7 @@
           <p:nvPr/>
         </p:nvPicPr>
         <p:blipFill>
-          <a:blip r:embed="rId2">
+          <a:blip r:embed="rId3">
             <a:extLst/>
           </a:blip>
           <a:srcRect t="79" r="3" b="83"/>
@@ -6846,7 +6930,7 @@
         </p:nvSpPr>
         <p:spPr>
           <a:xfrm>
-            <a:off x="7673687" y="1610096"/>
+            <a:off x="7666400" y="1545881"/>
             <a:ext cx="1759628" cy="1226296"/>
           </a:xfrm>
           <a:prstGeom prst="roundRect">
@@ -6910,7 +6994,7 @@
         </p:nvSpPr>
         <p:spPr>
           <a:xfrm>
-            <a:off x="6092749" y="1962392"/>
+            <a:off x="6092748" y="1906971"/>
             <a:ext cx="1702867" cy="541691"/>
           </a:xfrm>
           <a:prstGeom prst="rightArrow">
@@ -6954,7 +7038,7 @@
         </p:nvSpPr>
         <p:spPr>
           <a:xfrm>
-            <a:off x="4325833" y="1596566"/>
+            <a:off x="4325833" y="1522725"/>
             <a:ext cx="1759628" cy="1226296"/>
           </a:xfrm>
           <a:prstGeom prst="roundRect">
@@ -7056,7 +7140,7 @@
         </p:nvSpPr>
         <p:spPr>
           <a:xfrm>
-            <a:off x="789293" y="3015122"/>
+            <a:off x="789293" y="3049379"/>
             <a:ext cx="9956800" cy="3320397"/>
           </a:xfrm>
           <a:prstGeom prst="rect">
@@ -7116,10 +7200,10 @@
         </p:nvGrpSpPr>
         <p:grpSpPr>
           <a:xfrm>
-            <a:off x="1048531" y="1579428"/>
-            <a:ext cx="8496737" cy="1226296"/>
+            <a:off x="1024308" y="1533307"/>
+            <a:ext cx="8582748" cy="1226296"/>
             <a:chOff x="-1" y="-31207"/>
-            <a:chExt cx="7453814" cy="1226295"/>
+            <a:chExt cx="7529267" cy="1226295"/>
           </a:xfrm>
         </p:grpSpPr>
         <p:grpSp>
@@ -7208,8 +7292,8 @@
             </p:nvSpPr>
             <p:spPr>
               <a:xfrm>
-                <a:off x="318320" y="219282"/>
-                <a:ext cx="881064" cy="634582"/>
+                <a:off x="195761" y="219282"/>
+                <a:ext cx="1003622" cy="634582"/>
               </a:xfrm>
               <a:prstGeom prst="rect">
                 <a:avLst/>
@@ -7240,10 +7324,10 @@
                   </a:defRPr>
                 </a:pPr>
                 <a:r>
-                  <a:rPr sz="1600" dirty="0"/>
+                  <a:rPr sz="1600" b="1" dirty="0"/>
                   <a:t>Python Interface</a:t>
                 </a:r>
-                <a:endParaRPr sz="1100" dirty="0"/>
+                <a:endParaRPr sz="1100" b="1" dirty="0"/>
               </a:p>
             </p:txBody>
           </p:sp>
@@ -7256,7 +7340,7 @@
           </p:nvSpPr>
           <p:spPr>
             <a:xfrm>
-              <a:off x="5918920" y="234117"/>
+              <a:off x="5994373" y="233719"/>
               <a:ext cx="1534893" cy="710446"/>
             </a:xfrm>
             <a:prstGeom prst="rect">
@@ -7288,8 +7372,8 @@
                 </a:defRPr>
               </a:pPr>
               <a:r>
-                <a:rPr sz="1600" dirty="0"/>
-                <a:t>Keywords Plot</a:t>
+                <a:rPr lang="en-US" sz="1600" b="1" dirty="0"/>
+                <a:t>Plots:</a:t>
               </a:r>
             </a:p>
             <a:p>
@@ -7301,8 +7385,26 @@
                 </a:defRPr>
               </a:pPr>
               <a:r>
-                <a:rPr sz="1600" dirty="0"/>
-                <a:t>Stock Price Plot</a:t>
+                <a:rPr sz="1600" b="1" dirty="0"/>
+                <a:t>Keywords</a:t>
+              </a:r>
+              <a:r>
+                <a:rPr lang="en-US" sz="1600" b="1" dirty="0"/>
+                <a:t> &amp;</a:t>
+              </a:r>
+              <a:endParaRPr sz="1600" b="1" dirty="0"/>
+            </a:p>
+            <a:p>
+              <a:pPr>
+                <a:defRPr sz="1400">
+                  <a:solidFill>
+                    <a:srgbClr val="FFFFFF"/>
+                  </a:solidFill>
+                </a:defRPr>
+              </a:pPr>
+              <a:r>
+                <a:rPr sz="1600" b="1" dirty="0"/>
+                <a:t>Stock Price</a:t>
               </a:r>
             </a:p>
           </p:txBody>
@@ -7315,7 +7417,7 @@
           </p:nvSpPr>
           <p:spPr>
             <a:xfrm>
-              <a:off x="3148362" y="271947"/>
+              <a:off x="3058326" y="271947"/>
               <a:ext cx="1219556" cy="633991"/>
             </a:xfrm>
             <a:prstGeom prst="rect">
@@ -7347,10 +7449,10 @@
                 </a:defRPr>
               </a:pPr>
               <a:r>
-                <a:rPr dirty="0"/>
+                <a:rPr b="1" dirty="0"/>
                 <a:t>Date Finder</a:t>
               </a:r>
-              <a:endParaRPr sz="1415" dirty="0"/>
+              <a:endParaRPr sz="1415" b="1" dirty="0"/>
             </a:p>
             <a:p>
               <a:pPr>
@@ -7361,7 +7463,7 @@
                 </a:defRPr>
               </a:pPr>
               <a:r>
-                <a:rPr dirty="0"/>
+                <a:rPr b="1" dirty="0"/>
                 <a:t>ML Model </a:t>
               </a:r>
             </a:p>
@@ -7376,7 +7478,7 @@
         </p:nvSpPr>
         <p:spPr>
           <a:xfrm>
-            <a:off x="2736508" y="1965209"/>
+            <a:off x="2733755" y="1906972"/>
             <a:ext cx="1702867" cy="541691"/>
           </a:xfrm>
           <a:prstGeom prst="rightArrow">
@@ -7420,7 +7522,7 @@
         </p:nvSpPr>
         <p:spPr>
           <a:xfrm>
-            <a:off x="3027646" y="2038579"/>
+            <a:off x="2989949" y="1993151"/>
             <a:ext cx="1129870" cy="369330"/>
           </a:xfrm>
           <a:prstGeom prst="rect">
@@ -7496,7 +7598,7 @@
         </p:nvSpPr>
         <p:spPr>
           <a:xfrm>
-            <a:off x="6409854" y="2025049"/>
+            <a:off x="6345246" y="1968792"/>
             <a:ext cx="1068656" cy="369330"/>
           </a:xfrm>
           <a:prstGeom prst="rect">
@@ -7613,7 +7715,7 @@
         </p:nvSpPr>
         <p:spPr>
           <a:xfrm>
-            <a:off x="480671" y="4405745"/>
+            <a:off x="445693" y="4551080"/>
             <a:ext cx="10182332" cy="1450412"/>
           </a:xfrm>
           <a:prstGeom prst="rect">
@@ -7741,8 +7843,8 @@
         </p:nvSpPr>
         <p:spPr>
           <a:xfrm>
-            <a:off x="445694" y="1250487"/>
-            <a:ext cx="10527106" cy="3155258"/>
+            <a:off x="445693" y="1250486"/>
+            <a:ext cx="10811721" cy="3300593"/>
           </a:xfrm>
           <a:prstGeom prst="rect">
             <a:avLst/>
@@ -7758,7 +7860,7 @@
         </p:spPr>
         <p:txBody>
           <a:bodyPr lIns="45719" rIns="45719">
-            <a:normAutofit fontScale="92500" lnSpcReduction="10000"/>
+            <a:normAutofit fontScale="85000" lnSpcReduction="10000"/>
           </a:bodyPr>
           <a:lstStyle>
             <a:lvl1pPr marL="274320" marR="0" indent="-274320" algn="l" defTabSz="914400" rtl="0" latinLnBrk="0">
@@ -8068,7 +8170,7 @@
               <a:defRPr sz="2100"/>
             </a:pPr>
             <a:r>
-              <a:rPr lang="en-US" sz="2200" dirty="0"/>
+              <a:rPr lang="en-US" sz="2600" dirty="0"/>
               <a:t>Unbiased sample of Google search data from Google Trends</a:t>
             </a:r>
           </a:p>
@@ -8085,7 +8187,7 @@
               <a:defRPr sz="2100"/>
             </a:pPr>
             <a:r>
-              <a:rPr lang="en-US" sz="2200" dirty="0"/>
+              <a:rPr lang="en-US" sz="2600" dirty="0"/>
               <a:t>Normalized data</a:t>
             </a:r>
           </a:p>
@@ -8102,7 +8204,7 @@
               <a:defRPr sz="2100"/>
             </a:pPr>
             <a:r>
-              <a:rPr lang="en-US" sz="2200" dirty="0"/>
+              <a:rPr lang="en-US" sz="2600" dirty="0"/>
               <a:t>Data is indexed at 100, with 100 as the maximum search interest within the time frame selected</a:t>
             </a:r>
           </a:p>
@@ -8119,7 +8221,7 @@
               <a:defRPr sz="2100"/>
             </a:pPr>
             <a:r>
-              <a:rPr lang="en-US" sz="2200" dirty="0"/>
+              <a:rPr lang="en-US" sz="2600" dirty="0"/>
               <a:t>15 keywords search trends for Q-2 2007-2017</a:t>
             </a:r>
           </a:p>
@@ -8151,7 +8253,7 @@
               <a:defRPr sz="2100"/>
             </a:pPr>
             <a:r>
-              <a:rPr lang="en-US" sz="2200" dirty="0"/>
+              <a:rPr lang="en-US" sz="2600" dirty="0"/>
               <a:t>Daily adjusted close price within the Q-2 for 2007-2017 from Yahoo Finance</a:t>
             </a:r>
           </a:p>
@@ -9382,16 +9484,18 @@
         </p:nvSpPr>
         <p:spPr>
           <a:xfrm>
-            <a:off x="769496" y="1484371"/>
-            <a:ext cx="3292838" cy="849097"/>
+            <a:off x="1017777" y="1600199"/>
+            <a:ext cx="2834640" cy="640080"/>
           </a:xfrm>
           <a:prstGeom prst="ellipse">
             <a:avLst/>
           </a:prstGeom>
           <a:noFill/>
-          <a:ln w="25400" cap="flat">
+          <a:ln w="41275" cap="flat" cmpd="sng">
             <a:solidFill>
-              <a:schemeClr val="accent1"/>
+              <a:schemeClr val="accent2">
+                <a:lumMod val="75000"/>
+              </a:schemeClr>
             </a:solidFill>
             <a:prstDash val="solid"/>
             <a:round/>
@@ -9524,8 +9628,8 @@
         </p:nvSpPr>
         <p:spPr>
           <a:xfrm>
-            <a:off x="5046048" y="1452237"/>
-            <a:ext cx="5227211" cy="2062103"/>
+            <a:off x="4553832" y="1796288"/>
+            <a:ext cx="6134352" cy="1569660"/>
           </a:xfrm>
           <a:prstGeom prst="rect">
             <a:avLst/>
@@ -9581,11 +9685,19 @@
             </a:r>
             <a:r>
               <a:rPr sz="3200" dirty="0"/>
-              <a:t>nd dates of each quarter to</a:t>
+              <a:t>nd dates </a:t>
             </a:r>
             <a:r>
               <a:rPr lang="en-US" sz="3200" dirty="0"/>
-              <a:t> define the range of</a:t>
+              <a:t>for</a:t>
+            </a:r>
+            <a:r>
+              <a:rPr sz="3200" dirty="0"/>
+              <a:t> each quarter </a:t>
+            </a:r>
+            <a:r>
+              <a:rPr lang="en-US" sz="3200" dirty="0"/>
+              <a:t>define the range of</a:t>
             </a:r>
             <a:r>
               <a:rPr sz="3200" dirty="0"/>
@@ -9593,7 +9705,7 @@
             </a:r>
             <a:r>
               <a:rPr lang="en-US" sz="3200" dirty="0"/>
-              <a:t> used in the model</a:t>
+              <a:t> in the model</a:t>
             </a:r>
             <a:endParaRPr sz="3200" dirty="0"/>
           </a:p>
@@ -9607,8 +9719,8 @@
         </p:nvSpPr>
         <p:spPr>
           <a:xfrm>
-            <a:off x="705391" y="2330992"/>
-            <a:ext cx="2520242" cy="984885"/>
+            <a:off x="592304" y="1959770"/>
+            <a:ext cx="3299301" cy="1169551"/>
           </a:xfrm>
           <a:prstGeom prst="rect">
             <a:avLst/>
@@ -9621,21 +9733,29 @@
           <a:lstStyle/>
           <a:p>
             <a:r>
-              <a:rPr lang="en-US" sz="2000" dirty="0" err="1"/>
+              <a:rPr lang="en-US" sz="2600" b="1" dirty="0" err="1">
+                <a:latin typeface="Gill Sans MT" panose="020B0502020104020203" pitchFamily="34" charset="0"/>
+              </a:rPr>
               <a:t>get_quarter_begin</a:t>
             </a:r>
             <a:r>
-              <a:rPr lang="en-US" sz="2000" dirty="0"/>
+              <a:rPr lang="en-US" sz="2600" b="1" dirty="0">
+                <a:latin typeface="Gill Sans MT" panose="020B0502020104020203" pitchFamily="34" charset="0"/>
+              </a:rPr>
               <a:t>()</a:t>
             </a:r>
           </a:p>
           <a:p>
             <a:r>
-              <a:rPr lang="en-US" sz="2000" dirty="0" err="1"/>
+              <a:rPr lang="en-US" sz="2600" b="1" dirty="0" err="1">
+                <a:latin typeface="Gill Sans MT" panose="020B0502020104020203" pitchFamily="34" charset="0"/>
+              </a:rPr>
               <a:t>get_quarter_end</a:t>
             </a:r>
             <a:r>
-              <a:rPr lang="en-US" sz="2000" dirty="0"/>
+              <a:rPr lang="en-US" sz="2600" b="1" dirty="0">
+                <a:latin typeface="Gill Sans MT" panose="020B0502020104020203" pitchFamily="34" charset="0"/>
+              </a:rPr>
               <a:t>()</a:t>
             </a:r>
           </a:p>
@@ -9646,20 +9766,132 @@
       </p:sp>
       <p:sp>
         <p:nvSpPr>
-          <p:cNvPr id="3" name="Right Arrow 2"/>
+          <p:cNvPr id="9" name="Shape 225"/>
           <p:cNvSpPr/>
           <p:nvPr/>
         </p:nvSpPr>
         <p:spPr>
           <a:xfrm>
-            <a:off x="3570189" y="2338802"/>
-            <a:ext cx="978408" cy="484632"/>
+            <a:off x="4553832" y="3797171"/>
+            <a:ext cx="6134351" cy="1938992"/>
+          </a:xfrm>
+          <a:prstGeom prst="rect">
+            <a:avLst/>
+          </a:prstGeom>
+          <a:solidFill>
+            <a:srgbClr val="FAFAFA"/>
+          </a:solidFill>
+          <a:ln w="12700">
+            <a:solidFill>
+              <a:schemeClr val="accent1"/>
+            </a:solidFill>
+          </a:ln>
+          <a:extLst>
+            <a:ext uri="{C572A759-6A51-4108-AA02-DFA0A04FC94B}">
+              <ma14:wrappingTextBoxFlag xmlns="" xmlns:ma14="http://schemas.microsoft.com/office/mac/drawingml/2011/main" val="1"/>
+            </a:ext>
+          </a:extLst>
+        </p:spPr>
+        <p:txBody>
+          <a:bodyPr wrap="square" lIns="45719" rIns="45719">
+            <a:spAutoFit/>
+          </a:bodyPr>
+          <a:lstStyle/>
+          <a:p>
+            <a:pPr marL="365760" indent="-457200">
+              <a:buSzPct val="100000"/>
+              <a:defRPr sz="2400">
+                <a:latin typeface="Gill Sans MT"/>
+                <a:ea typeface="Gill Sans MT"/>
+                <a:cs typeface="Gill Sans MT"/>
+                <a:sym typeface="Gill Sans MT"/>
+              </a:defRPr>
+            </a:pPr>
+            <a:r>
+              <a:rPr lang="en-US" sz="3000" dirty="0"/>
+              <a:t>1. Get the </a:t>
+            </a:r>
+            <a:r>
+              <a:rPr lang="en-US" sz="3000" dirty="0"/>
+              <a:t>earnings </a:t>
+            </a:r>
+            <a:r>
+              <a:rPr lang="en-US" sz="3000" dirty="0"/>
+              <a:t>release date for each company from Yahoo finance</a:t>
+            </a:r>
+          </a:p>
+          <a:p>
+            <a:pPr marL="365760" indent="-457200">
+              <a:buSzPct val="100000"/>
+              <a:defRPr sz="2400">
+                <a:latin typeface="Gill Sans MT"/>
+                <a:ea typeface="Gill Sans MT"/>
+                <a:cs typeface="Gill Sans MT"/>
+                <a:sym typeface="Gill Sans MT"/>
+              </a:defRPr>
+            </a:pPr>
+            <a:r>
+              <a:rPr lang="en-US" sz="3000" dirty="0"/>
+              <a:t>2. This date is used in the ML model for prediction</a:t>
+            </a:r>
+          </a:p>
+        </p:txBody>
+      </p:sp>
+      <p:sp>
+        <p:nvSpPr>
+          <p:cNvPr id="4" name="Rectangle 3"/>
+          <p:cNvSpPr/>
+          <p:nvPr/>
+        </p:nvSpPr>
+        <p:spPr>
+          <a:xfrm>
+            <a:off x="592304" y="4629721"/>
+            <a:ext cx="3267241" cy="492443"/>
+          </a:xfrm>
+          <a:prstGeom prst="rect">
+            <a:avLst/>
+          </a:prstGeom>
+        </p:spPr>
+        <p:txBody>
+          <a:bodyPr wrap="none">
+            <a:spAutoFit/>
+          </a:bodyPr>
+          <a:lstStyle/>
+          <a:p>
+            <a:r>
+              <a:rPr lang="en-US" sz="2600" b="1" dirty="0" err="1">
+                <a:latin typeface="Gill Sans MT" panose="020B0502020104020203" pitchFamily="34" charset="0"/>
+              </a:rPr>
+              <a:t>get_earnings_data</a:t>
+            </a:r>
+            <a:r>
+              <a:rPr lang="en-US" sz="2600" b="1" dirty="0">
+                <a:latin typeface="Gill Sans MT" panose="020B0502020104020203" pitchFamily="34" charset="0"/>
+              </a:rPr>
+              <a:t>()</a:t>
+            </a:r>
+          </a:p>
+        </p:txBody>
+      </p:sp>
+      <p:sp>
+        <p:nvSpPr>
+          <p:cNvPr id="12" name="Right Arrow 10"/>
+          <p:cNvSpPr/>
+          <p:nvPr/>
+        </p:nvSpPr>
+        <p:spPr>
+          <a:xfrm>
+            <a:off x="2800707" y="2859864"/>
+            <a:ext cx="1422011" cy="540979"/>
           </a:xfrm>
           <a:prstGeom prst="rightArrow">
             <a:avLst/>
           </a:prstGeom>
           <a:solidFill>
-            <a:srgbClr val="FFFFFF"/>
+            <a:schemeClr val="accent1">
+              <a:lumMod val="40000"/>
+              <a:lumOff val="60000"/>
+            </a:schemeClr>
           </a:solidFill>
           <a:ln w="25400" cap="flat">
             <a:solidFill>
@@ -9730,117 +9962,23 @@
       </p:sp>
       <p:sp>
         <p:nvSpPr>
-          <p:cNvPr id="9" name="Shape 225"/>
+          <p:cNvPr id="13" name="Right Arrow 10"/>
           <p:cNvSpPr/>
           <p:nvPr/>
         </p:nvSpPr>
         <p:spPr>
           <a:xfrm>
-            <a:off x="5046048" y="3703316"/>
-            <a:ext cx="5227212" cy="2400657"/>
-          </a:xfrm>
-          <a:prstGeom prst="rect">
+            <a:off x="2800707" y="5122164"/>
+            <a:ext cx="1422011" cy="540979"/>
+          </a:xfrm>
+          <a:prstGeom prst="rightArrow">
             <a:avLst/>
           </a:prstGeom>
           <a:solidFill>
-            <a:srgbClr val="FAFAFA"/>
-          </a:solidFill>
-          <a:ln w="12700">
-            <a:solidFill>
-              <a:schemeClr val="accent1"/>
-            </a:solidFill>
-          </a:ln>
-          <a:extLst>
-            <a:ext uri="{C572A759-6A51-4108-AA02-DFA0A04FC94B}">
-              <ma14:wrappingTextBoxFlag xmlns="" xmlns:ma14="http://schemas.microsoft.com/office/mac/drawingml/2011/main" val="1"/>
-            </a:ext>
-          </a:extLst>
-        </p:spPr>
-        <p:txBody>
-          <a:bodyPr wrap="square" lIns="45719" rIns="45719">
-            <a:spAutoFit/>
-          </a:bodyPr>
-          <a:lstStyle/>
-          <a:p>
-            <a:pPr>
-              <a:buSzPct val="100000"/>
-              <a:defRPr sz="2400">
-                <a:latin typeface="Gill Sans MT"/>
-                <a:ea typeface="Gill Sans MT"/>
-                <a:cs typeface="Gill Sans MT"/>
-                <a:sym typeface="Gill Sans MT"/>
-              </a:defRPr>
-            </a:pPr>
-            <a:r>
-              <a:rPr lang="en-US" sz="3000" dirty="0"/>
-              <a:t>1. Get the Earnings Report release date for each company from Yahoo finance</a:t>
-            </a:r>
-          </a:p>
-          <a:p>
-            <a:pPr>
-              <a:buSzPct val="100000"/>
-              <a:defRPr sz="2400">
-                <a:latin typeface="Gill Sans MT"/>
-                <a:ea typeface="Gill Sans MT"/>
-                <a:cs typeface="Gill Sans MT"/>
-                <a:sym typeface="Gill Sans MT"/>
-              </a:defRPr>
-            </a:pPr>
-            <a:r>
-              <a:rPr lang="en-US" sz="3000" dirty="0"/>
-              <a:t>2. This date is used in the ML model for prediction</a:t>
-            </a:r>
-          </a:p>
-        </p:txBody>
-      </p:sp>
-      <p:sp>
-        <p:nvSpPr>
-          <p:cNvPr id="4" name="Rectangle 3"/>
-          <p:cNvSpPr/>
-          <p:nvPr/>
-        </p:nvSpPr>
-        <p:spPr>
-          <a:xfrm>
-            <a:off x="681347" y="4703589"/>
-            <a:ext cx="2544286" cy="400110"/>
-          </a:xfrm>
-          <a:prstGeom prst="rect">
-            <a:avLst/>
-          </a:prstGeom>
-        </p:spPr>
-        <p:txBody>
-          <a:bodyPr wrap="none">
-            <a:spAutoFit/>
-          </a:bodyPr>
-          <a:lstStyle/>
-          <a:p>
-            <a:r>
-              <a:rPr lang="en-US" sz="2000" dirty="0" err="1"/>
-              <a:t>get_earnings_data</a:t>
-            </a:r>
-            <a:r>
-              <a:rPr lang="en-US" sz="2000" dirty="0"/>
-              <a:t>()</a:t>
-            </a:r>
-          </a:p>
-        </p:txBody>
-      </p:sp>
-      <p:sp>
-        <p:nvSpPr>
-          <p:cNvPr id="11" name="Right Arrow 10"/>
-          <p:cNvSpPr/>
-          <p:nvPr/>
-        </p:nvSpPr>
-        <p:spPr>
-          <a:xfrm>
-            <a:off x="3570189" y="4661328"/>
-            <a:ext cx="978408" cy="484632"/>
-          </a:xfrm>
-          <a:prstGeom prst="rightArrow">
-            <a:avLst/>
-          </a:prstGeom>
-          <a:solidFill>
-            <a:srgbClr val="FFFFFF"/>
+            <a:schemeClr val="accent1">
+              <a:lumMod val="40000"/>
+              <a:lumOff val="60000"/>
+            </a:schemeClr>
           </a:solidFill>
           <a:ln w="25400" cap="flat">
             <a:solidFill>

</xml_diff>

<commit_message>
Changed the interaction design in the design document and the final presentation. Modified the interaction design.png file. Added Earningrport into test folder for testing purposes. Edited the design document to remove the focus from EPS reports.
</commit_message>
<xml_diff>
--- a/Doc/FinalPresentation.pptx
+++ b/Doc/FinalPresentation.pptx
@@ -4739,7 +4739,7 @@
           </a:ln>
           <a:extLst>
             <a:ext uri="{C572A759-6A51-4108-AA02-DFA0A04FC94B}">
-              <ma14:wrappingTextBoxFlag xmlns="" xmlns:ma14="http://schemas.microsoft.com/office/mac/drawingml/2011/main" val="1"/>
+              <ma14:wrappingTextBoxFlag xmlns:ma14="http://schemas.microsoft.com/office/mac/drawingml/2011/main" xmlns="" val="1"/>
             </a:ext>
           </a:extLst>
         </p:spPr>
@@ -4778,7 +4778,7 @@
           </a:ln>
           <a:extLst>
             <a:ext uri="{C572A759-6A51-4108-AA02-DFA0A04FC94B}">
-              <ma14:wrappingTextBoxFlag xmlns="" xmlns:ma14="http://schemas.microsoft.com/office/mac/drawingml/2011/main" val="1"/>
+              <ma14:wrappingTextBoxFlag xmlns:ma14="http://schemas.microsoft.com/office/mac/drawingml/2011/main" xmlns="" val="1"/>
             </a:ext>
           </a:extLst>
         </p:spPr>
@@ -5802,7 +5802,7 @@
           </a:ln>
           <a:extLst>
             <a:ext uri="{C572A759-6A51-4108-AA02-DFA0A04FC94B}">
-              <ma14:wrappingTextBoxFlag xmlns="" xmlns:ma14="http://schemas.microsoft.com/office/mac/drawingml/2011/main" val="1"/>
+              <ma14:wrappingTextBoxFlag xmlns:ma14="http://schemas.microsoft.com/office/mac/drawingml/2011/main" xmlns="" val="1"/>
             </a:ext>
           </a:extLst>
         </p:spPr>
@@ -6028,7 +6028,7 @@
           </a:ln>
           <a:extLst>
             <a:ext uri="{C572A759-6A51-4108-AA02-DFA0A04FC94B}">
-              <ma14:wrappingTextBoxFlag xmlns="" xmlns:ma14="http://schemas.microsoft.com/office/mac/drawingml/2011/main" val="1"/>
+              <ma14:wrappingTextBoxFlag xmlns:ma14="http://schemas.microsoft.com/office/mac/drawingml/2011/main" xmlns="" val="1"/>
             </a:ext>
           </a:extLst>
         </p:spPr>
@@ -6443,7 +6443,7 @@
           </a:ln>
           <a:extLst>
             <a:ext uri="{C572A759-6A51-4108-AA02-DFA0A04FC94B}">
-              <ma14:wrappingTextBoxFlag xmlns="" xmlns:ma14="http://schemas.microsoft.com/office/mac/drawingml/2011/main" val="1"/>
+              <ma14:wrappingTextBoxFlag xmlns:ma14="http://schemas.microsoft.com/office/mac/drawingml/2011/main" xmlns="" val="1"/>
             </a:ext>
           </a:extLst>
         </p:spPr>
@@ -6486,7 +6486,7 @@
           </a:ln>
           <a:extLst>
             <a:ext uri="{C572A759-6A51-4108-AA02-DFA0A04FC94B}">
-              <ma14:wrappingTextBoxFlag xmlns="" xmlns:ma14="http://schemas.microsoft.com/office/mac/drawingml/2011/main" val="1"/>
+              <ma14:wrappingTextBoxFlag xmlns:ma14="http://schemas.microsoft.com/office/mac/drawingml/2011/main" xmlns="" val="1"/>
             </a:ext>
           </a:extLst>
         </p:spPr>
@@ -7306,7 +7306,7 @@
               <a:effectLst/>
               <a:extLst>
                 <a:ext uri="{C572A759-6A51-4108-AA02-DFA0A04FC94B}">
-                  <ma14:wrappingTextBoxFlag xmlns="" xmlns:ma14="http://schemas.microsoft.com/office/mac/drawingml/2011/main" val="1"/>
+                  <ma14:wrappingTextBoxFlag xmlns:ma14="http://schemas.microsoft.com/office/mac/drawingml/2011/main" xmlns="" val="1"/>
                 </a:ext>
               </a:extLst>
             </p:spPr>
@@ -7354,7 +7354,7 @@
             <a:effectLst/>
             <a:extLst>
               <a:ext uri="{C572A759-6A51-4108-AA02-DFA0A04FC94B}">
-                <ma14:wrappingTextBoxFlag xmlns="" xmlns:ma14="http://schemas.microsoft.com/office/mac/drawingml/2011/main" val="1"/>
+                <ma14:wrappingTextBoxFlag xmlns:ma14="http://schemas.microsoft.com/office/mac/drawingml/2011/main" xmlns="" val="1"/>
               </a:ext>
             </a:extLst>
           </p:spPr>
@@ -7431,7 +7431,7 @@
             <a:effectLst/>
             <a:extLst>
               <a:ext uri="{C572A759-6A51-4108-AA02-DFA0A04FC94B}">
-                <ma14:wrappingTextBoxFlag xmlns="" xmlns:ma14="http://schemas.microsoft.com/office/mac/drawingml/2011/main" val="1"/>
+                <ma14:wrappingTextBoxFlag xmlns:ma14="http://schemas.microsoft.com/office/mac/drawingml/2011/main" xmlns="" val="1"/>
               </a:ext>
             </a:extLst>
           </p:spPr>
@@ -7808,7 +7808,7 @@
           </a:ln>
           <a:extLst>
             <a:ext uri="{C572A759-6A51-4108-AA02-DFA0A04FC94B}">
-              <ma14:wrappingTextBoxFlag xmlns="" xmlns:ma14="http://schemas.microsoft.com/office/mac/drawingml/2011/main" val="1"/>
+              <ma14:wrappingTextBoxFlag xmlns:ma14="http://schemas.microsoft.com/office/mac/drawingml/2011/main" xmlns="" val="1"/>
             </a:ext>
           </a:extLst>
         </p:spPr>
@@ -7854,7 +7854,7 @@
           </a:ln>
           <a:extLst>
             <a:ext uri="{C572A759-6A51-4108-AA02-DFA0A04FC94B}">
-              <ma14:wrappingTextBoxFlag xmlns="" xmlns:ma14="http://schemas.microsoft.com/office/mac/drawingml/2011/main" val="1"/>
+              <ma14:wrappingTextBoxFlag xmlns:ma14="http://schemas.microsoft.com/office/mac/drawingml/2011/main" xmlns="" val="1"/>
             </a:ext>
           </a:extLst>
         </p:spPr>
@@ -8410,7 +8410,7 @@
             <a:effectLst/>
             <a:extLst>
               <a:ext uri="{C572A759-6A51-4108-AA02-DFA0A04FC94B}">
-                <ma14:wrappingTextBoxFlag xmlns="" xmlns:ma14="http://schemas.microsoft.com/office/mac/drawingml/2011/main" val="1"/>
+                <ma14:wrappingTextBoxFlag xmlns:ma14="http://schemas.microsoft.com/office/mac/drawingml/2011/main" xmlns="" val="1"/>
               </a:ext>
             </a:extLst>
           </p:spPr>
@@ -8544,7 +8544,7 @@
             <a:effectLst/>
             <a:extLst>
               <a:ext uri="{C572A759-6A51-4108-AA02-DFA0A04FC94B}">
-                <ma14:wrappingTextBoxFlag xmlns="" xmlns:ma14="http://schemas.microsoft.com/office/mac/drawingml/2011/main" val="1"/>
+                <ma14:wrappingTextBoxFlag xmlns:ma14="http://schemas.microsoft.com/office/mac/drawingml/2011/main" xmlns="" val="1"/>
               </a:ext>
             </a:extLst>
           </p:spPr>
@@ -8678,7 +8678,7 @@
             <a:effectLst/>
             <a:extLst>
               <a:ext uri="{C572A759-6A51-4108-AA02-DFA0A04FC94B}">
-                <ma14:wrappingTextBoxFlag xmlns="" xmlns:ma14="http://schemas.microsoft.com/office/mac/drawingml/2011/main" val="1"/>
+                <ma14:wrappingTextBoxFlag xmlns:ma14="http://schemas.microsoft.com/office/mac/drawingml/2011/main" xmlns="" val="1"/>
               </a:ext>
             </a:extLst>
           </p:spPr>
@@ -8827,7 +8827,7 @@
             <a:effectLst/>
             <a:extLst>
               <a:ext uri="{C572A759-6A51-4108-AA02-DFA0A04FC94B}">
-                <ma14:wrappingTextBoxFlag xmlns="" xmlns:ma14="http://schemas.microsoft.com/office/mac/drawingml/2011/main" val="1"/>
+                <ma14:wrappingTextBoxFlag xmlns:ma14="http://schemas.microsoft.com/office/mac/drawingml/2011/main" xmlns="" val="1"/>
               </a:ext>
             </a:extLst>
           </p:spPr>
@@ -8976,7 +8976,7 @@
             <a:effectLst/>
             <a:extLst>
               <a:ext uri="{C572A759-6A51-4108-AA02-DFA0A04FC94B}">
-                <ma14:wrappingTextBoxFlag xmlns="" xmlns:ma14="http://schemas.microsoft.com/office/mac/drawingml/2011/main" val="1"/>
+                <ma14:wrappingTextBoxFlag xmlns:ma14="http://schemas.microsoft.com/office/mac/drawingml/2011/main" xmlns="" val="1"/>
               </a:ext>
             </a:extLst>
           </p:spPr>
@@ -9124,7 +9124,7 @@
             <a:effectLst/>
             <a:extLst>
               <a:ext uri="{C572A759-6A51-4108-AA02-DFA0A04FC94B}">
-                <ma14:wrappingTextBoxFlag xmlns="" xmlns:ma14="http://schemas.microsoft.com/office/mac/drawingml/2011/main" val="1"/>
+                <ma14:wrappingTextBoxFlag xmlns:ma14="http://schemas.microsoft.com/office/mac/drawingml/2011/main" xmlns="" val="1"/>
               </a:ext>
             </a:extLst>
           </p:spPr>
@@ -9449,7 +9449,7 @@
       </p:sp>
       <p:pic>
         <p:nvPicPr>
-          <p:cNvPr id="220" name="image3.tif"/>
+          <p:cNvPr id="4" name="Picture 3"/>
           <p:cNvPicPr>
             <a:picLocks noChangeAspect="1"/>
           </p:cNvPicPr>
@@ -9457,7 +9457,11 @@
         </p:nvPicPr>
         <p:blipFill>
           <a:blip r:embed="rId3">
-            <a:extLst/>
+            <a:extLst>
+              <a:ext uri="{28A0092B-C50C-407E-A947-70E740481C1C}">
+                <a14:useLocalDpi xmlns:a14="http://schemas.microsoft.com/office/drawing/2010/main" val="0"/>
+              </a:ext>
+            </a:extLst>
           </a:blip>
           <a:stretch>
             <a:fillRect/>
@@ -9465,37 +9469,342 @@
         </p:blipFill>
         <p:spPr>
           <a:xfrm>
-            <a:off x="609601" y="274638"/>
-            <a:ext cx="9956801" cy="6315143"/>
+            <a:off x="165359" y="274638"/>
+            <a:ext cx="10522628" cy="6199315"/>
           </a:xfrm>
           <a:prstGeom prst="rect">
             <a:avLst/>
           </a:prstGeom>
-          <a:ln w="12700">
-            <a:miter lim="400000"/>
-          </a:ln>
         </p:spPr>
       </p:pic>
-      <p:sp>
-        <p:nvSpPr>
-          <p:cNvPr id="3" name="Oval 2"/>
+    </p:spTree>
+  </p:cSld>
+  <p:clrMapOvr>
+    <a:masterClrMapping/>
+  </p:clrMapOvr>
+  <p:transition spd="med"/>
+</p:sld>
+</file>
+
+<file path=ppt/slides/slide7.xml><?xml version="1.0" encoding="utf-8"?>
+<p:sld xmlns:a="http://schemas.openxmlformats.org/drawingml/2006/main" xmlns:r="http://schemas.openxmlformats.org/officeDocument/2006/relationships" xmlns:p="http://schemas.openxmlformats.org/presentationml/2006/main">
+  <p:cSld>
+    <p:spTree>
+      <p:nvGrpSpPr>
+        <p:cNvPr id="1" name=""/>
+        <p:cNvGrpSpPr/>
+        <p:nvPr/>
+      </p:nvGrpSpPr>
+      <p:grpSpPr>
+        <a:xfrm>
+          <a:off x="0" y="0"/>
+          <a:ext cx="0" cy="0"/>
+          <a:chOff x="0" y="0"/>
+          <a:chExt cx="0" cy="0"/>
+        </a:xfrm>
+      </p:grpSpPr>
+      <p:sp>
+        <p:nvSpPr>
+          <p:cNvPr id="222" name="Shape 222"/>
+          <p:cNvSpPr>
+            <a:spLocks noGrp="1"/>
+          </p:cNvSpPr>
+          <p:nvPr>
+            <p:ph type="title"/>
+          </p:nvPr>
+        </p:nvSpPr>
+        <p:spPr>
+          <a:xfrm>
+            <a:off x="592304" y="120259"/>
+            <a:ext cx="9956800" cy="1143001"/>
+          </a:xfrm>
+          <a:prstGeom prst="rect">
+            <a:avLst/>
+          </a:prstGeom>
+        </p:spPr>
+        <p:txBody>
+          <a:bodyPr/>
+          <a:lstStyle>
+            <a:lvl1pPr>
+              <a:defRPr sz="3200" b="1"/>
+            </a:lvl1pPr>
+          </a:lstStyle>
+          <a:p>
+            <a:r>
+              <a:rPr dirty="0"/>
+              <a:t>Control Logic – Earnings Report Module</a:t>
+            </a:r>
+          </a:p>
+        </p:txBody>
+      </p:sp>
+      <p:sp>
+        <p:nvSpPr>
+          <p:cNvPr id="225" name="Shape 225"/>
           <p:cNvSpPr/>
           <p:nvPr/>
         </p:nvSpPr>
         <p:spPr>
           <a:xfrm>
-            <a:off x="1017777" y="1600199"/>
-            <a:ext cx="2834640" cy="640080"/>
-          </a:xfrm>
-          <a:prstGeom prst="ellipse">
-            <a:avLst/>
-          </a:prstGeom>
-          <a:noFill/>
-          <a:ln w="41275" cap="flat" cmpd="sng">
+            <a:off x="4553832" y="1796288"/>
+            <a:ext cx="6134352" cy="1569660"/>
+          </a:xfrm>
+          <a:prstGeom prst="rect">
+            <a:avLst/>
+          </a:prstGeom>
+          <a:solidFill>
+            <a:srgbClr val="FAFAFA"/>
+          </a:solidFill>
+          <a:ln w="12700">
             <a:solidFill>
-              <a:schemeClr val="accent2">
-                <a:lumMod val="75000"/>
-              </a:schemeClr>
+              <a:schemeClr val="accent1"/>
+            </a:solidFill>
+          </a:ln>
+          <a:extLst>
+            <a:ext uri="{C572A759-6A51-4108-AA02-DFA0A04FC94B}">
+              <ma14:wrappingTextBoxFlag xmlns:ma14="http://schemas.microsoft.com/office/mac/drawingml/2011/main" xmlns="" val="1"/>
+            </a:ext>
+          </a:extLst>
+        </p:spPr>
+        <p:txBody>
+          <a:bodyPr wrap="square" lIns="45719" rIns="45719">
+            <a:spAutoFit/>
+          </a:bodyPr>
+          <a:lstStyle/>
+          <a:p>
+            <a:pPr>
+              <a:buSzPct val="100000"/>
+              <a:defRPr sz="2400">
+                <a:latin typeface="Gill Sans MT"/>
+                <a:ea typeface="Gill Sans MT"/>
+                <a:cs typeface="Gill Sans MT"/>
+                <a:sym typeface="Gill Sans MT"/>
+              </a:defRPr>
+            </a:pPr>
+            <a:r>
+              <a:rPr lang="en-US" sz="3200" dirty="0"/>
+              <a:t>T</a:t>
+            </a:r>
+            <a:r>
+              <a:rPr sz="3200" dirty="0"/>
+              <a:t>he </a:t>
+            </a:r>
+            <a:r>
+              <a:rPr lang="en-US" sz="3200" dirty="0"/>
+              <a:t>s</a:t>
+            </a:r>
+            <a:r>
+              <a:rPr sz="3200" dirty="0"/>
+              <a:t>tart and </a:t>
+            </a:r>
+            <a:r>
+              <a:rPr lang="en-US" sz="3200" dirty="0"/>
+              <a:t>e</a:t>
+            </a:r>
+            <a:r>
+              <a:rPr sz="3200" dirty="0"/>
+              <a:t>nd dates </a:t>
+            </a:r>
+            <a:r>
+              <a:rPr lang="en-US" sz="3200" dirty="0"/>
+              <a:t>for</a:t>
+            </a:r>
+            <a:r>
+              <a:rPr sz="3200" dirty="0"/>
+              <a:t> each quarter </a:t>
+            </a:r>
+            <a:r>
+              <a:rPr lang="en-US" sz="3200" dirty="0"/>
+              <a:t>define the range of</a:t>
+            </a:r>
+            <a:r>
+              <a:rPr sz="3200" dirty="0"/>
+              <a:t> Google trends data</a:t>
+            </a:r>
+            <a:r>
+              <a:rPr lang="en-US" sz="3200" dirty="0"/>
+              <a:t> in the model</a:t>
+            </a:r>
+            <a:endParaRPr sz="3200" dirty="0"/>
+          </a:p>
+        </p:txBody>
+      </p:sp>
+      <p:sp>
+        <p:nvSpPr>
+          <p:cNvPr id="2" name="Rectangle 1"/>
+          <p:cNvSpPr/>
+          <p:nvPr/>
+        </p:nvSpPr>
+        <p:spPr>
+          <a:xfrm>
+            <a:off x="592304" y="1959770"/>
+            <a:ext cx="3299301" cy="1169551"/>
+          </a:xfrm>
+          <a:prstGeom prst="rect">
+            <a:avLst/>
+          </a:prstGeom>
+        </p:spPr>
+        <p:txBody>
+          <a:bodyPr wrap="none">
+            <a:spAutoFit/>
+          </a:bodyPr>
+          <a:lstStyle/>
+          <a:p>
+            <a:r>
+              <a:rPr lang="en-US" sz="2600" b="1" dirty="0" err="1">
+                <a:latin typeface="Gill Sans MT" panose="020B0502020104020203" pitchFamily="34" charset="0"/>
+              </a:rPr>
+              <a:t>get_quarter_begin</a:t>
+            </a:r>
+            <a:r>
+              <a:rPr lang="en-US" sz="2600" b="1" dirty="0">
+                <a:latin typeface="Gill Sans MT" panose="020B0502020104020203" pitchFamily="34" charset="0"/>
+              </a:rPr>
+              <a:t>()</a:t>
+            </a:r>
+          </a:p>
+          <a:p>
+            <a:r>
+              <a:rPr lang="en-US" sz="2600" b="1" dirty="0" err="1">
+                <a:latin typeface="Gill Sans MT" panose="020B0502020104020203" pitchFamily="34" charset="0"/>
+              </a:rPr>
+              <a:t>get_quarter_end</a:t>
+            </a:r>
+            <a:r>
+              <a:rPr lang="en-US" sz="2600" b="1" dirty="0">
+                <a:latin typeface="Gill Sans MT" panose="020B0502020104020203" pitchFamily="34" charset="0"/>
+              </a:rPr>
+              <a:t>()</a:t>
+            </a:r>
+          </a:p>
+          <a:p>
+            <a:endParaRPr lang="en-US" dirty="0"/>
+          </a:p>
+        </p:txBody>
+      </p:sp>
+      <p:sp>
+        <p:nvSpPr>
+          <p:cNvPr id="9" name="Shape 225"/>
+          <p:cNvSpPr/>
+          <p:nvPr/>
+        </p:nvSpPr>
+        <p:spPr>
+          <a:xfrm>
+            <a:off x="4553832" y="3797171"/>
+            <a:ext cx="6134351" cy="1938992"/>
+          </a:xfrm>
+          <a:prstGeom prst="rect">
+            <a:avLst/>
+          </a:prstGeom>
+          <a:solidFill>
+            <a:srgbClr val="FAFAFA"/>
+          </a:solidFill>
+          <a:ln w="12700">
+            <a:solidFill>
+              <a:schemeClr val="accent1"/>
+            </a:solidFill>
+          </a:ln>
+          <a:extLst>
+            <a:ext uri="{C572A759-6A51-4108-AA02-DFA0A04FC94B}">
+              <ma14:wrappingTextBoxFlag xmlns:ma14="http://schemas.microsoft.com/office/mac/drawingml/2011/main" xmlns="" val="1"/>
+            </a:ext>
+          </a:extLst>
+        </p:spPr>
+        <p:txBody>
+          <a:bodyPr wrap="square" lIns="45719" rIns="45719">
+            <a:spAutoFit/>
+          </a:bodyPr>
+          <a:lstStyle/>
+          <a:p>
+            <a:pPr marL="365760" indent="-457200">
+              <a:buSzPct val="100000"/>
+              <a:defRPr sz="2400">
+                <a:latin typeface="Gill Sans MT"/>
+                <a:ea typeface="Gill Sans MT"/>
+                <a:cs typeface="Gill Sans MT"/>
+                <a:sym typeface="Gill Sans MT"/>
+              </a:defRPr>
+            </a:pPr>
+            <a:r>
+              <a:rPr lang="en-US" sz="3000" dirty="0"/>
+              <a:t>1. Get the earnings release date for each company from Yahoo finance</a:t>
+            </a:r>
+          </a:p>
+          <a:p>
+            <a:pPr marL="365760" indent="-457200">
+              <a:buSzPct val="100000"/>
+              <a:defRPr sz="2400">
+                <a:latin typeface="Gill Sans MT"/>
+                <a:ea typeface="Gill Sans MT"/>
+                <a:cs typeface="Gill Sans MT"/>
+                <a:sym typeface="Gill Sans MT"/>
+              </a:defRPr>
+            </a:pPr>
+            <a:r>
+              <a:rPr lang="en-US" sz="3000" dirty="0"/>
+              <a:t>2. This date is used in the ML model for prediction</a:t>
+            </a:r>
+          </a:p>
+        </p:txBody>
+      </p:sp>
+      <p:sp>
+        <p:nvSpPr>
+          <p:cNvPr id="4" name="Rectangle 3"/>
+          <p:cNvSpPr/>
+          <p:nvPr/>
+        </p:nvSpPr>
+        <p:spPr>
+          <a:xfrm>
+            <a:off x="592304" y="4629721"/>
+            <a:ext cx="3267241" cy="492443"/>
+          </a:xfrm>
+          <a:prstGeom prst="rect">
+            <a:avLst/>
+          </a:prstGeom>
+        </p:spPr>
+        <p:txBody>
+          <a:bodyPr wrap="none">
+            <a:spAutoFit/>
+          </a:bodyPr>
+          <a:lstStyle/>
+          <a:p>
+            <a:r>
+              <a:rPr lang="en-US" sz="2600" b="1" dirty="0" err="1">
+                <a:latin typeface="Gill Sans MT" panose="020B0502020104020203" pitchFamily="34" charset="0"/>
+              </a:rPr>
+              <a:t>get_earnings_data</a:t>
+            </a:r>
+            <a:r>
+              <a:rPr lang="en-US" sz="2600" b="1" dirty="0">
+                <a:latin typeface="Gill Sans MT" panose="020B0502020104020203" pitchFamily="34" charset="0"/>
+              </a:rPr>
+              <a:t>()</a:t>
+            </a:r>
+          </a:p>
+        </p:txBody>
+      </p:sp>
+      <p:sp>
+        <p:nvSpPr>
+          <p:cNvPr id="12" name="Right Arrow 10"/>
+          <p:cNvSpPr/>
+          <p:nvPr/>
+        </p:nvSpPr>
+        <p:spPr>
+          <a:xfrm>
+            <a:off x="2800707" y="2859864"/>
+            <a:ext cx="1422011" cy="540979"/>
+          </a:xfrm>
+          <a:prstGeom prst="rightArrow">
+            <a:avLst/>
+          </a:prstGeom>
+          <a:solidFill>
+            <a:schemeClr val="accent1">
+              <a:lumMod val="40000"/>
+              <a:lumOff val="60000"/>
+            </a:schemeClr>
+          </a:solidFill>
+          <a:ln w="25400" cap="flat">
+            <a:solidFill>
+              <a:schemeClr val="accent1"/>
             </a:solidFill>
             <a:prstDash val="solid"/>
             <a:round/>
@@ -9560,328 +9869,15 @@
           </a:p>
         </p:txBody>
       </p:sp>
-    </p:spTree>
-  </p:cSld>
-  <p:clrMapOvr>
-    <a:masterClrMapping/>
-  </p:clrMapOvr>
-  <p:transition spd="med"/>
-</p:sld>
-</file>
-
-<file path=ppt/slides/slide7.xml><?xml version="1.0" encoding="utf-8"?>
-<p:sld xmlns:a="http://schemas.openxmlformats.org/drawingml/2006/main" xmlns:r="http://schemas.openxmlformats.org/officeDocument/2006/relationships" xmlns:p="http://schemas.openxmlformats.org/presentationml/2006/main">
-  <p:cSld>
-    <p:spTree>
-      <p:nvGrpSpPr>
-        <p:cNvPr id="1" name=""/>
-        <p:cNvGrpSpPr/>
-        <p:nvPr/>
-      </p:nvGrpSpPr>
-      <p:grpSpPr>
-        <a:xfrm>
-          <a:off x="0" y="0"/>
-          <a:ext cx="0" cy="0"/>
-          <a:chOff x="0" y="0"/>
-          <a:chExt cx="0" cy="0"/>
-        </a:xfrm>
-      </p:grpSpPr>
-      <p:sp>
-        <p:nvSpPr>
-          <p:cNvPr id="222" name="Shape 222"/>
-          <p:cNvSpPr>
-            <a:spLocks noGrp="1"/>
-          </p:cNvSpPr>
-          <p:nvPr>
-            <p:ph type="title"/>
-          </p:nvPr>
-        </p:nvSpPr>
-        <p:spPr>
-          <a:xfrm>
-            <a:off x="592304" y="120259"/>
-            <a:ext cx="9956800" cy="1143001"/>
-          </a:xfrm>
-          <a:prstGeom prst="rect">
-            <a:avLst/>
-          </a:prstGeom>
-        </p:spPr>
-        <p:txBody>
-          <a:bodyPr/>
-          <a:lstStyle>
-            <a:lvl1pPr>
-              <a:defRPr sz="3200" b="1"/>
-            </a:lvl1pPr>
-          </a:lstStyle>
-          <a:p>
-            <a:r>
-              <a:rPr dirty="0"/>
-              <a:t>Control Logic – Earnings Report Module</a:t>
-            </a:r>
-          </a:p>
-        </p:txBody>
-      </p:sp>
-      <p:sp>
-        <p:nvSpPr>
-          <p:cNvPr id="225" name="Shape 225"/>
+      <p:sp>
+        <p:nvSpPr>
+          <p:cNvPr id="13" name="Right Arrow 10"/>
           <p:cNvSpPr/>
           <p:nvPr/>
         </p:nvSpPr>
         <p:spPr>
           <a:xfrm>
-            <a:off x="4553832" y="1796288"/>
-            <a:ext cx="6134352" cy="1569660"/>
-          </a:xfrm>
-          <a:prstGeom prst="rect">
-            <a:avLst/>
-          </a:prstGeom>
-          <a:solidFill>
-            <a:srgbClr val="FAFAFA"/>
-          </a:solidFill>
-          <a:ln w="12700">
-            <a:solidFill>
-              <a:schemeClr val="accent1"/>
-            </a:solidFill>
-          </a:ln>
-          <a:extLst>
-            <a:ext uri="{C572A759-6A51-4108-AA02-DFA0A04FC94B}">
-              <ma14:wrappingTextBoxFlag xmlns="" xmlns:ma14="http://schemas.microsoft.com/office/mac/drawingml/2011/main" val="1"/>
-            </a:ext>
-          </a:extLst>
-        </p:spPr>
-        <p:txBody>
-          <a:bodyPr wrap="square" lIns="45719" rIns="45719">
-            <a:spAutoFit/>
-          </a:bodyPr>
-          <a:lstStyle/>
-          <a:p>
-            <a:pPr>
-              <a:buSzPct val="100000"/>
-              <a:defRPr sz="2400">
-                <a:latin typeface="Gill Sans MT"/>
-                <a:ea typeface="Gill Sans MT"/>
-                <a:cs typeface="Gill Sans MT"/>
-                <a:sym typeface="Gill Sans MT"/>
-              </a:defRPr>
-            </a:pPr>
-            <a:r>
-              <a:rPr lang="en-US" sz="3200" dirty="0"/>
-              <a:t>T</a:t>
-            </a:r>
-            <a:r>
-              <a:rPr sz="3200" dirty="0"/>
-              <a:t>he </a:t>
-            </a:r>
-            <a:r>
-              <a:rPr lang="en-US" sz="3200" dirty="0"/>
-              <a:t>s</a:t>
-            </a:r>
-            <a:r>
-              <a:rPr sz="3200" dirty="0"/>
-              <a:t>tart and </a:t>
-            </a:r>
-            <a:r>
-              <a:rPr lang="en-US" sz="3200" dirty="0"/>
-              <a:t>e</a:t>
-            </a:r>
-            <a:r>
-              <a:rPr sz="3200" dirty="0"/>
-              <a:t>nd dates </a:t>
-            </a:r>
-            <a:r>
-              <a:rPr lang="en-US" sz="3200" dirty="0"/>
-              <a:t>for</a:t>
-            </a:r>
-            <a:r>
-              <a:rPr sz="3200" dirty="0"/>
-              <a:t> each quarter </a:t>
-            </a:r>
-            <a:r>
-              <a:rPr lang="en-US" sz="3200" dirty="0"/>
-              <a:t>define the range of</a:t>
-            </a:r>
-            <a:r>
-              <a:rPr sz="3200" dirty="0"/>
-              <a:t> Google trends data</a:t>
-            </a:r>
-            <a:r>
-              <a:rPr lang="en-US" sz="3200" dirty="0"/>
-              <a:t> in the model</a:t>
-            </a:r>
-            <a:endParaRPr sz="3200" dirty="0"/>
-          </a:p>
-        </p:txBody>
-      </p:sp>
-      <p:sp>
-        <p:nvSpPr>
-          <p:cNvPr id="2" name="Rectangle 1"/>
-          <p:cNvSpPr/>
-          <p:nvPr/>
-        </p:nvSpPr>
-        <p:spPr>
-          <a:xfrm>
-            <a:off x="592304" y="1959770"/>
-            <a:ext cx="3299301" cy="1169551"/>
-          </a:xfrm>
-          <a:prstGeom prst="rect">
-            <a:avLst/>
-          </a:prstGeom>
-        </p:spPr>
-        <p:txBody>
-          <a:bodyPr wrap="none">
-            <a:spAutoFit/>
-          </a:bodyPr>
-          <a:lstStyle/>
-          <a:p>
-            <a:r>
-              <a:rPr lang="en-US" sz="2600" b="1" dirty="0" err="1">
-                <a:latin typeface="Gill Sans MT" panose="020B0502020104020203" pitchFamily="34" charset="0"/>
-              </a:rPr>
-              <a:t>get_quarter_begin</a:t>
-            </a:r>
-            <a:r>
-              <a:rPr lang="en-US" sz="2600" b="1" dirty="0">
-                <a:latin typeface="Gill Sans MT" panose="020B0502020104020203" pitchFamily="34" charset="0"/>
-              </a:rPr>
-              <a:t>()</a:t>
-            </a:r>
-          </a:p>
-          <a:p>
-            <a:r>
-              <a:rPr lang="en-US" sz="2600" b="1" dirty="0" err="1">
-                <a:latin typeface="Gill Sans MT" panose="020B0502020104020203" pitchFamily="34" charset="0"/>
-              </a:rPr>
-              <a:t>get_quarter_end</a:t>
-            </a:r>
-            <a:r>
-              <a:rPr lang="en-US" sz="2600" b="1" dirty="0">
-                <a:latin typeface="Gill Sans MT" panose="020B0502020104020203" pitchFamily="34" charset="0"/>
-              </a:rPr>
-              <a:t>()</a:t>
-            </a:r>
-          </a:p>
-          <a:p>
-            <a:endParaRPr lang="en-US" dirty="0"/>
-          </a:p>
-        </p:txBody>
-      </p:sp>
-      <p:sp>
-        <p:nvSpPr>
-          <p:cNvPr id="9" name="Shape 225"/>
-          <p:cNvSpPr/>
-          <p:nvPr/>
-        </p:nvSpPr>
-        <p:spPr>
-          <a:xfrm>
-            <a:off x="4553832" y="3797171"/>
-            <a:ext cx="6134351" cy="1938992"/>
-          </a:xfrm>
-          <a:prstGeom prst="rect">
-            <a:avLst/>
-          </a:prstGeom>
-          <a:solidFill>
-            <a:srgbClr val="FAFAFA"/>
-          </a:solidFill>
-          <a:ln w="12700">
-            <a:solidFill>
-              <a:schemeClr val="accent1"/>
-            </a:solidFill>
-          </a:ln>
-          <a:extLst>
-            <a:ext uri="{C572A759-6A51-4108-AA02-DFA0A04FC94B}">
-              <ma14:wrappingTextBoxFlag xmlns="" xmlns:ma14="http://schemas.microsoft.com/office/mac/drawingml/2011/main" val="1"/>
-            </a:ext>
-          </a:extLst>
-        </p:spPr>
-        <p:txBody>
-          <a:bodyPr wrap="square" lIns="45719" rIns="45719">
-            <a:spAutoFit/>
-          </a:bodyPr>
-          <a:lstStyle/>
-          <a:p>
-            <a:pPr marL="365760" indent="-457200">
-              <a:buSzPct val="100000"/>
-              <a:defRPr sz="2400">
-                <a:latin typeface="Gill Sans MT"/>
-                <a:ea typeface="Gill Sans MT"/>
-                <a:cs typeface="Gill Sans MT"/>
-                <a:sym typeface="Gill Sans MT"/>
-              </a:defRPr>
-            </a:pPr>
-            <a:r>
-              <a:rPr lang="en-US" sz="3000" dirty="0"/>
-              <a:t>1. Get the </a:t>
-            </a:r>
-            <a:r>
-              <a:rPr lang="en-US" sz="3000" dirty="0"/>
-              <a:t>earnings </a:t>
-            </a:r>
-            <a:r>
-              <a:rPr lang="en-US" sz="3000" dirty="0"/>
-              <a:t>release date for each company from Yahoo finance</a:t>
-            </a:r>
-          </a:p>
-          <a:p>
-            <a:pPr marL="365760" indent="-457200">
-              <a:buSzPct val="100000"/>
-              <a:defRPr sz="2400">
-                <a:latin typeface="Gill Sans MT"/>
-                <a:ea typeface="Gill Sans MT"/>
-                <a:cs typeface="Gill Sans MT"/>
-                <a:sym typeface="Gill Sans MT"/>
-              </a:defRPr>
-            </a:pPr>
-            <a:r>
-              <a:rPr lang="en-US" sz="3000" dirty="0"/>
-              <a:t>2. This date is used in the ML model for prediction</a:t>
-            </a:r>
-          </a:p>
-        </p:txBody>
-      </p:sp>
-      <p:sp>
-        <p:nvSpPr>
-          <p:cNvPr id="4" name="Rectangle 3"/>
-          <p:cNvSpPr/>
-          <p:nvPr/>
-        </p:nvSpPr>
-        <p:spPr>
-          <a:xfrm>
-            <a:off x="592304" y="4629721"/>
-            <a:ext cx="3267241" cy="492443"/>
-          </a:xfrm>
-          <a:prstGeom prst="rect">
-            <a:avLst/>
-          </a:prstGeom>
-        </p:spPr>
-        <p:txBody>
-          <a:bodyPr wrap="none">
-            <a:spAutoFit/>
-          </a:bodyPr>
-          <a:lstStyle/>
-          <a:p>
-            <a:r>
-              <a:rPr lang="en-US" sz="2600" b="1" dirty="0" err="1">
-                <a:latin typeface="Gill Sans MT" panose="020B0502020104020203" pitchFamily="34" charset="0"/>
-              </a:rPr>
-              <a:t>get_earnings_data</a:t>
-            </a:r>
-            <a:r>
-              <a:rPr lang="en-US" sz="2600" b="1" dirty="0">
-                <a:latin typeface="Gill Sans MT" panose="020B0502020104020203" pitchFamily="34" charset="0"/>
-              </a:rPr>
-              <a:t>()</a:t>
-            </a:r>
-          </a:p>
-        </p:txBody>
-      </p:sp>
-      <p:sp>
-        <p:nvSpPr>
-          <p:cNvPr id="12" name="Right Arrow 10"/>
-          <p:cNvSpPr/>
-          <p:nvPr/>
-        </p:nvSpPr>
-        <p:spPr>
-          <a:xfrm>
-            <a:off x="2800707" y="2859864"/>
+            <a:off x="2800707" y="5122164"/>
             <a:ext cx="1422011" cy="540979"/>
           </a:xfrm>
           <a:prstGeom prst="rightArrow">
@@ -9960,25 +9956,82 @@
           </a:p>
         </p:txBody>
       </p:sp>
-      <p:sp>
-        <p:nvSpPr>
-          <p:cNvPr id="13" name="Right Arrow 10"/>
+    </p:spTree>
+  </p:cSld>
+  <p:clrMapOvr>
+    <a:masterClrMapping/>
+  </p:clrMapOvr>
+  <p:transition spd="med"/>
+</p:sld>
+</file>
+
+<file path=ppt/slides/slide8.xml><?xml version="1.0" encoding="utf-8"?>
+<p:sld xmlns:a="http://schemas.openxmlformats.org/drawingml/2006/main" xmlns:r="http://schemas.openxmlformats.org/officeDocument/2006/relationships" xmlns:p="http://schemas.openxmlformats.org/presentationml/2006/main">
+  <p:cSld>
+    <p:spTree>
+      <p:nvGrpSpPr>
+        <p:cNvPr id="1" name=""/>
+        <p:cNvGrpSpPr/>
+        <p:nvPr/>
+      </p:nvGrpSpPr>
+      <p:grpSpPr>
+        <a:xfrm>
+          <a:off x="0" y="0"/>
+          <a:ext cx="0" cy="0"/>
+          <a:chOff x="0" y="0"/>
+          <a:chExt cx="0" cy="0"/>
+        </a:xfrm>
+      </p:grpSpPr>
+      <p:sp>
+        <p:nvSpPr>
+          <p:cNvPr id="246" name="Shape 246"/>
+          <p:cNvSpPr>
+            <a:spLocks noGrp="1"/>
+          </p:cNvSpPr>
+          <p:nvPr>
+            <p:ph type="title"/>
+          </p:nvPr>
+        </p:nvSpPr>
+        <p:spPr>
+          <a:xfrm>
+            <a:off x="609599" y="274638"/>
+            <a:ext cx="10861966" cy="1143001"/>
+          </a:xfrm>
+          <a:prstGeom prst="rect">
+            <a:avLst/>
+          </a:prstGeom>
+        </p:spPr>
+        <p:txBody>
+          <a:bodyPr/>
+          <a:lstStyle/>
+          <a:p>
+            <a:pPr>
+              <a:defRPr sz="3200" b="1"/>
+            </a:pPr>
+            <a:r>
+              <a:t>Control Logic – PredictionStockPrice Module</a:t>
+            </a:r>
+            <a:br/>
+            <a:endParaRPr/>
+          </a:p>
+        </p:txBody>
+      </p:sp>
+      <p:sp>
+        <p:nvSpPr>
+          <p:cNvPr id="4" name="Right Arrow 3"/>
           <p:cNvSpPr/>
           <p:nvPr/>
         </p:nvSpPr>
         <p:spPr>
           <a:xfrm>
-            <a:off x="2800707" y="5122164"/>
-            <a:ext cx="1422011" cy="540979"/>
+            <a:off x="5443374" y="4543313"/>
+            <a:ext cx="978408" cy="484632"/>
           </a:xfrm>
           <a:prstGeom prst="rightArrow">
             <a:avLst/>
           </a:prstGeom>
           <a:solidFill>
-            <a:schemeClr val="accent1">
-              <a:lumMod val="40000"/>
-              <a:lumOff val="60000"/>
-            </a:schemeClr>
+            <a:srgbClr val="FFFFFF"/>
           </a:solidFill>
           <a:ln w="25400" cap="flat">
             <a:solidFill>
@@ -10047,75 +10100,245 @@
           </a:p>
         </p:txBody>
       </p:sp>
-    </p:spTree>
-  </p:cSld>
-  <p:clrMapOvr>
-    <a:masterClrMapping/>
-  </p:clrMapOvr>
-  <p:transition spd="med"/>
-</p:sld>
-</file>
-
-<file path=ppt/slides/slide8.xml><?xml version="1.0" encoding="utf-8"?>
-<p:sld xmlns:a="http://schemas.openxmlformats.org/drawingml/2006/main" xmlns:r="http://schemas.openxmlformats.org/officeDocument/2006/relationships" xmlns:p="http://schemas.openxmlformats.org/presentationml/2006/main">
-  <p:cSld>
-    <p:spTree>
-      <p:nvGrpSpPr>
-        <p:cNvPr id="1" name=""/>
-        <p:cNvGrpSpPr/>
-        <p:nvPr/>
-      </p:nvGrpSpPr>
-      <p:grpSpPr>
-        <a:xfrm>
-          <a:off x="0" y="0"/>
-          <a:ext cx="0" cy="0"/>
-          <a:chOff x="0" y="0"/>
-          <a:chExt cx="0" cy="0"/>
-        </a:xfrm>
-      </p:grpSpPr>
-      <p:sp>
-        <p:nvSpPr>
-          <p:cNvPr id="246" name="Shape 246"/>
-          <p:cNvSpPr>
-            <a:spLocks noGrp="1"/>
-          </p:cNvSpPr>
-          <p:nvPr>
-            <p:ph type="title"/>
-          </p:nvPr>
-        </p:nvSpPr>
-        <p:spPr>
-          <a:xfrm>
-            <a:off x="609599" y="274638"/>
-            <a:ext cx="10861966" cy="1143001"/>
-          </a:xfrm>
-          <a:prstGeom prst="rect">
-            <a:avLst/>
-          </a:prstGeom>
-        </p:spPr>
-        <p:txBody>
-          <a:bodyPr/>
-          <a:lstStyle/>
-          <a:p>
-            <a:pPr>
-              <a:defRPr sz="3200" b="1"/>
-            </a:pPr>
-            <a:r>
-              <a:t>Control Logic – PredictionStockPrice Module</a:t>
-            </a:r>
-            <a:br/>
-            <a:endParaRPr/>
-          </a:p>
-        </p:txBody>
-      </p:sp>
-      <p:sp>
-        <p:nvSpPr>
-          <p:cNvPr id="4" name="Right Arrow 3"/>
+      <p:sp>
+        <p:nvSpPr>
+          <p:cNvPr id="2" name="Rectangle 1"/>
           <p:cNvSpPr/>
           <p:nvPr/>
         </p:nvSpPr>
         <p:spPr>
           <a:xfrm>
-            <a:off x="5443374" y="4543313"/>
+            <a:off x="609599" y="1458788"/>
+            <a:ext cx="4606978" cy="1400383"/>
+          </a:xfrm>
+          <a:prstGeom prst="rect">
+            <a:avLst/>
+          </a:prstGeom>
+        </p:spPr>
+        <p:txBody>
+          <a:bodyPr wrap="square">
+            <a:spAutoFit/>
+          </a:bodyPr>
+          <a:lstStyle/>
+          <a:p>
+            <a:pPr marL="365760" lvl="1" indent="0">
+              <a:spcBef>
+                <a:spcPts val="300"/>
+              </a:spcBef>
+              <a:defRPr sz="1600"/>
+            </a:pPr>
+            <a:r>
+              <a:rPr lang="en-US" sz="2000" dirty="0" err="1"/>
+              <a:t>feature_selection</a:t>
+            </a:r>
+            <a:r>
+              <a:rPr lang="en-US" sz="2000" dirty="0"/>
+              <a:t>()</a:t>
+            </a:r>
+          </a:p>
+          <a:p>
+            <a:pPr marL="651510" lvl="1" indent="-285750">
+              <a:spcBef>
+                <a:spcPts val="300"/>
+              </a:spcBef>
+              <a:buFont typeface="Arial" panose="020B0604020202020204" pitchFamily="34" charset="0"/>
+              <a:buChar char="•"/>
+              <a:defRPr sz="1600"/>
+            </a:pPr>
+            <a:r>
+              <a:rPr lang="en-US" sz="2000" dirty="0"/>
+              <a:t>Get trend data for all Google Trend keywords</a:t>
+            </a:r>
+          </a:p>
+          <a:p>
+            <a:pPr marL="651510" lvl="1" indent="-285750">
+              <a:spcBef>
+                <a:spcPts val="300"/>
+              </a:spcBef>
+              <a:buFont typeface="Arial" panose="020B0604020202020204" pitchFamily="34" charset="0"/>
+              <a:buChar char="•"/>
+              <a:defRPr sz="1600"/>
+            </a:pPr>
+            <a:r>
+              <a:rPr lang="en-US" sz="2000" dirty="0"/>
+              <a:t>Get daily stock price data</a:t>
+            </a:r>
+          </a:p>
+        </p:txBody>
+      </p:sp>
+      <p:sp>
+        <p:nvSpPr>
+          <p:cNvPr id="6" name="Shape 225"/>
+          <p:cNvSpPr/>
+          <p:nvPr/>
+        </p:nvSpPr>
+        <p:spPr>
+          <a:xfrm>
+            <a:off x="6736106" y="1191306"/>
+            <a:ext cx="4167061" cy="2677656"/>
+          </a:xfrm>
+          <a:prstGeom prst="rect">
+            <a:avLst/>
+          </a:prstGeom>
+          <a:solidFill>
+            <a:srgbClr val="FAFAFA"/>
+          </a:solidFill>
+          <a:ln w="12700">
+            <a:solidFill>
+              <a:schemeClr val="accent1"/>
+            </a:solidFill>
+          </a:ln>
+          <a:extLst>
+            <a:ext uri="{C572A759-6A51-4108-AA02-DFA0A04FC94B}">
+              <ma14:wrappingTextBoxFlag xmlns:ma14="http://schemas.microsoft.com/office/mac/drawingml/2011/main" xmlns="" val="1"/>
+            </a:ext>
+          </a:extLst>
+        </p:spPr>
+        <p:txBody>
+          <a:bodyPr wrap="square" lIns="45719" rIns="45719">
+            <a:spAutoFit/>
+          </a:bodyPr>
+          <a:lstStyle/>
+          <a:p>
+            <a:pPr marL="457200" indent="-457200">
+              <a:buSzPct val="100000"/>
+              <a:buAutoNum type="arabicPeriod"/>
+              <a:defRPr sz="2400">
+                <a:latin typeface="Gill Sans MT"/>
+                <a:ea typeface="Gill Sans MT"/>
+                <a:cs typeface="Gill Sans MT"/>
+                <a:sym typeface="Gill Sans MT"/>
+              </a:defRPr>
+            </a:pPr>
+            <a:r>
+              <a:rPr lang="en-US" dirty="0"/>
+              <a:t>Generate the keyword list with the 5 keywords with high impact on Stock Price</a:t>
+            </a:r>
+          </a:p>
+          <a:p>
+            <a:pPr marL="457200" indent="-457200">
+              <a:buSzPct val="100000"/>
+              <a:buAutoNum type="arabicPeriod"/>
+              <a:defRPr sz="2400">
+                <a:latin typeface="Gill Sans MT"/>
+                <a:ea typeface="Gill Sans MT"/>
+                <a:cs typeface="Gill Sans MT"/>
+                <a:sym typeface="Gill Sans MT"/>
+              </a:defRPr>
+            </a:pPr>
+            <a:r>
+              <a:rPr lang="en-US" dirty="0"/>
+              <a:t>The keyword list is used by the ML model for prediction</a:t>
+            </a:r>
+          </a:p>
+          <a:p>
+            <a:pPr marL="457200" indent="-457200">
+              <a:buSzPct val="100000"/>
+              <a:buAutoNum type="arabicPeriod"/>
+              <a:defRPr sz="2400">
+                <a:latin typeface="Gill Sans MT"/>
+                <a:ea typeface="Gill Sans MT"/>
+                <a:cs typeface="Gill Sans MT"/>
+                <a:sym typeface="Gill Sans MT"/>
+              </a:defRPr>
+            </a:pPr>
+            <a:r>
+              <a:rPr lang="en-US" dirty="0"/>
+              <a:t>The keyword list is used by the plot function</a:t>
+            </a:r>
+          </a:p>
+        </p:txBody>
+      </p:sp>
+      <p:sp>
+        <p:nvSpPr>
+          <p:cNvPr id="3" name="Rectangle 2"/>
+          <p:cNvSpPr/>
+          <p:nvPr/>
+        </p:nvSpPr>
+        <p:spPr>
+          <a:xfrm>
+            <a:off x="869430" y="3662245"/>
+            <a:ext cx="4452078" cy="2246769"/>
+          </a:xfrm>
+          <a:prstGeom prst="rect">
+            <a:avLst/>
+          </a:prstGeom>
+        </p:spPr>
+        <p:txBody>
+          <a:bodyPr wrap="square">
+            <a:spAutoFit/>
+          </a:bodyPr>
+          <a:lstStyle/>
+          <a:p>
+            <a:r>
+              <a:rPr lang="en-US" sz="2000" dirty="0" err="1"/>
+              <a:t>prediction_model</a:t>
+            </a:r>
+            <a:r>
+              <a:rPr lang="en-US" sz="2000" dirty="0"/>
+              <a:t>:</a:t>
+            </a:r>
+          </a:p>
+          <a:p>
+            <a:pPr marL="342900" lvl="1" indent="-342900">
+              <a:buFont typeface="Arial" panose="020B0604020202020204" pitchFamily="34" charset="0"/>
+              <a:buChar char="•"/>
+            </a:pPr>
+            <a:r>
+              <a:rPr lang="en-US" sz="2000" dirty="0"/>
+              <a:t>Keywords identified by </a:t>
+            </a:r>
+            <a:r>
+              <a:rPr lang="en-US" sz="2000" dirty="0" err="1"/>
+              <a:t>feature_selection</a:t>
+            </a:r>
+            <a:r>
+              <a:rPr lang="en-US" sz="2000" dirty="0"/>
+              <a:t>()</a:t>
+            </a:r>
+          </a:p>
+          <a:p>
+            <a:pPr marL="342900" lvl="1" indent="-342900">
+              <a:buFont typeface="Arial" panose="020B0604020202020204" pitchFamily="34" charset="0"/>
+              <a:buChar char="•"/>
+            </a:pPr>
+            <a:r>
+              <a:rPr lang="en-US" sz="2000" dirty="0"/>
+              <a:t>Daily stock price data</a:t>
+            </a:r>
+          </a:p>
+          <a:p>
+            <a:pPr marL="342900" lvl="1" indent="-342900">
+              <a:buFont typeface="Arial" panose="020B0604020202020204" pitchFamily="34" charset="0"/>
+              <a:buChar char="•"/>
+            </a:pPr>
+            <a:r>
+              <a:rPr lang="en-US" sz="2000" dirty="0"/>
+              <a:t>Earnings Report date from </a:t>
+            </a:r>
+            <a:r>
+              <a:rPr lang="en-US" sz="2000" dirty="0" err="1"/>
+              <a:t>get_earnings_data</a:t>
+            </a:r>
+            <a:r>
+              <a:rPr lang="en-US" sz="2000" dirty="0"/>
+              <a:t>()</a:t>
+            </a:r>
+          </a:p>
+          <a:p>
+            <a:endParaRPr lang="en-US" sz="2000" dirty="0"/>
+          </a:p>
+        </p:txBody>
+      </p:sp>
+      <p:sp>
+        <p:nvSpPr>
+          <p:cNvPr id="9" name="Right Arrow 8"/>
+          <p:cNvSpPr/>
+          <p:nvPr/>
+        </p:nvSpPr>
+        <p:spPr>
+          <a:xfrm>
+            <a:off x="5443374" y="2066763"/>
             <a:ext cx="978408" cy="484632"/>
           </a:xfrm>
           <a:prstGeom prst="rightArrow">
@@ -10193,88 +10416,14 @@
       </p:sp>
       <p:sp>
         <p:nvSpPr>
-          <p:cNvPr id="2" name="Rectangle 1"/>
+          <p:cNvPr id="10" name="Shape 225"/>
           <p:cNvSpPr/>
           <p:nvPr/>
         </p:nvSpPr>
         <p:spPr>
           <a:xfrm>
-            <a:off x="609599" y="1458788"/>
-            <a:ext cx="4606978" cy="1400383"/>
-          </a:xfrm>
-          <a:prstGeom prst="rect">
-            <a:avLst/>
-          </a:prstGeom>
-        </p:spPr>
-        <p:txBody>
-          <a:bodyPr wrap="square">
-            <a:spAutoFit/>
-          </a:bodyPr>
-          <a:lstStyle/>
-          <a:p>
-            <a:pPr marL="365760" lvl="1" indent="0">
-              <a:spcBef>
-                <a:spcPts val="300"/>
-              </a:spcBef>
-              <a:defRPr sz="1600"/>
-            </a:pPr>
-            <a:r>
-              <a:rPr lang="en-US" sz="2000" dirty="0" err="1"/>
-              <a:t>feature_selection</a:t>
-            </a:r>
-            <a:r>
-              <a:rPr lang="en-US" sz="2000" dirty="0"/>
-              <a:t>()</a:t>
-            </a:r>
-          </a:p>
-          <a:p>
-            <a:pPr marL="651510" lvl="1" indent="-285750">
-              <a:spcBef>
-                <a:spcPts val="300"/>
-              </a:spcBef>
-              <a:buFont typeface="Arial" panose="020B0604020202020204" pitchFamily="34" charset="0"/>
-              <a:buChar char="•"/>
-              <a:defRPr sz="1600"/>
-            </a:pPr>
-            <a:r>
-              <a:rPr lang="en-US" sz="2000" dirty="0"/>
-              <a:t>Get trend data for all </a:t>
-            </a:r>
-            <a:r>
-              <a:rPr lang="en-US" sz="2000" dirty="0"/>
-              <a:t>Google Trend </a:t>
-            </a:r>
-            <a:r>
-              <a:rPr lang="en-US" sz="2000" dirty="0"/>
-              <a:t>keywords</a:t>
-            </a:r>
-          </a:p>
-          <a:p>
-            <a:pPr marL="651510" lvl="1" indent="-285750">
-              <a:spcBef>
-                <a:spcPts val="300"/>
-              </a:spcBef>
-              <a:buFont typeface="Arial" panose="020B0604020202020204" pitchFamily="34" charset="0"/>
-              <a:buChar char="•"/>
-              <a:defRPr sz="1600"/>
-            </a:pPr>
-            <a:r>
-              <a:rPr lang="en-US" sz="2000" dirty="0"/>
-              <a:t>Get daily stock price data</a:t>
-            </a:r>
-          </a:p>
-        </p:txBody>
-      </p:sp>
-      <p:sp>
-        <p:nvSpPr>
-          <p:cNvPr id="6" name="Shape 225"/>
-          <p:cNvSpPr/>
-          <p:nvPr/>
-        </p:nvSpPr>
-        <p:spPr>
-          <a:xfrm>
-            <a:off x="6736106" y="1191306"/>
-            <a:ext cx="4167061" cy="2677656"/>
+            <a:off x="6736106" y="4000800"/>
+            <a:ext cx="4127087" cy="1569660"/>
           </a:xfrm>
           <a:prstGeom prst="rect">
             <a:avLst/>
@@ -10289,255 +10438,7 @@
           </a:ln>
           <a:extLst>
             <a:ext uri="{C572A759-6A51-4108-AA02-DFA0A04FC94B}">
-              <ma14:wrappingTextBoxFlag xmlns="" xmlns:ma14="http://schemas.microsoft.com/office/mac/drawingml/2011/main" val="1"/>
-            </a:ext>
-          </a:extLst>
-        </p:spPr>
-        <p:txBody>
-          <a:bodyPr wrap="square" lIns="45719" rIns="45719">
-            <a:spAutoFit/>
-          </a:bodyPr>
-          <a:lstStyle/>
-          <a:p>
-            <a:pPr marL="457200" indent="-457200">
-              <a:buSzPct val="100000"/>
-              <a:buAutoNum type="arabicPeriod"/>
-              <a:defRPr sz="2400">
-                <a:latin typeface="Gill Sans MT"/>
-                <a:ea typeface="Gill Sans MT"/>
-                <a:cs typeface="Gill Sans MT"/>
-                <a:sym typeface="Gill Sans MT"/>
-              </a:defRPr>
-            </a:pPr>
-            <a:r>
-              <a:rPr lang="en-US" dirty="0"/>
-              <a:t>Generate the keyword list with the 5 keywords with high impact on Stock Price</a:t>
-            </a:r>
-          </a:p>
-          <a:p>
-            <a:pPr marL="457200" indent="-457200">
-              <a:buSzPct val="100000"/>
-              <a:buAutoNum type="arabicPeriod"/>
-              <a:defRPr sz="2400">
-                <a:latin typeface="Gill Sans MT"/>
-                <a:ea typeface="Gill Sans MT"/>
-                <a:cs typeface="Gill Sans MT"/>
-                <a:sym typeface="Gill Sans MT"/>
-              </a:defRPr>
-            </a:pPr>
-            <a:r>
-              <a:rPr lang="en-US" dirty="0"/>
-              <a:t>The keyword list is used by the ML model for prediction</a:t>
-            </a:r>
-          </a:p>
-          <a:p>
-            <a:pPr marL="457200" indent="-457200">
-              <a:buSzPct val="100000"/>
-              <a:buAutoNum type="arabicPeriod"/>
-              <a:defRPr sz="2400">
-                <a:latin typeface="Gill Sans MT"/>
-                <a:ea typeface="Gill Sans MT"/>
-                <a:cs typeface="Gill Sans MT"/>
-                <a:sym typeface="Gill Sans MT"/>
-              </a:defRPr>
-            </a:pPr>
-            <a:r>
-              <a:rPr lang="en-US" dirty="0"/>
-              <a:t>The keyword list is used by the plot function</a:t>
-            </a:r>
-          </a:p>
-        </p:txBody>
-      </p:sp>
-      <p:sp>
-        <p:nvSpPr>
-          <p:cNvPr id="3" name="Rectangle 2"/>
-          <p:cNvSpPr/>
-          <p:nvPr/>
-        </p:nvSpPr>
-        <p:spPr>
-          <a:xfrm>
-            <a:off x="869430" y="3662245"/>
-            <a:ext cx="4452078" cy="2246769"/>
-          </a:xfrm>
-          <a:prstGeom prst="rect">
-            <a:avLst/>
-          </a:prstGeom>
-        </p:spPr>
-        <p:txBody>
-          <a:bodyPr wrap="square">
-            <a:spAutoFit/>
-          </a:bodyPr>
-          <a:lstStyle/>
-          <a:p>
-            <a:r>
-              <a:rPr lang="en-US" sz="2000" dirty="0" err="1"/>
-              <a:t>prediction_model</a:t>
-            </a:r>
-            <a:r>
-              <a:rPr lang="en-US" sz="2000" dirty="0"/>
-              <a:t>:</a:t>
-            </a:r>
-          </a:p>
-          <a:p>
-            <a:pPr marL="342900" lvl="1" indent="-342900">
-              <a:buFont typeface="Arial" panose="020B0604020202020204" pitchFamily="34" charset="0"/>
-              <a:buChar char="•"/>
-            </a:pPr>
-            <a:r>
-              <a:rPr lang="en-US" sz="2000" dirty="0"/>
-              <a:t>Keywords identified by </a:t>
-            </a:r>
-            <a:r>
-              <a:rPr lang="en-US" sz="2000" dirty="0" err="1"/>
-              <a:t>feature_selection</a:t>
-            </a:r>
-            <a:r>
-              <a:rPr lang="en-US" sz="2000" dirty="0"/>
-              <a:t>()</a:t>
-            </a:r>
-          </a:p>
-          <a:p>
-            <a:pPr marL="342900" lvl="1" indent="-342900">
-              <a:buFont typeface="Arial" panose="020B0604020202020204" pitchFamily="34" charset="0"/>
-              <a:buChar char="•"/>
-            </a:pPr>
-            <a:r>
-              <a:rPr lang="en-US" sz="2000" dirty="0"/>
-              <a:t>Daily stock price data</a:t>
-            </a:r>
-          </a:p>
-          <a:p>
-            <a:pPr marL="342900" lvl="1" indent="-342900">
-              <a:buFont typeface="Arial" panose="020B0604020202020204" pitchFamily="34" charset="0"/>
-              <a:buChar char="•"/>
-            </a:pPr>
-            <a:r>
-              <a:rPr lang="en-US" sz="2000" dirty="0"/>
-              <a:t>Earnings Report date from </a:t>
-            </a:r>
-            <a:r>
-              <a:rPr lang="en-US" sz="2000" dirty="0" err="1"/>
-              <a:t>get_earnings_data</a:t>
-            </a:r>
-            <a:r>
-              <a:rPr lang="en-US" sz="2000" dirty="0"/>
-              <a:t>()</a:t>
-            </a:r>
-          </a:p>
-          <a:p>
-            <a:endParaRPr lang="en-US" sz="2000" dirty="0"/>
-          </a:p>
-        </p:txBody>
-      </p:sp>
-      <p:sp>
-        <p:nvSpPr>
-          <p:cNvPr id="9" name="Right Arrow 8"/>
-          <p:cNvSpPr/>
-          <p:nvPr/>
-        </p:nvSpPr>
-        <p:spPr>
-          <a:xfrm>
-            <a:off x="5443374" y="2066763"/>
-            <a:ext cx="978408" cy="484632"/>
-          </a:xfrm>
-          <a:prstGeom prst="rightArrow">
-            <a:avLst/>
-          </a:prstGeom>
-          <a:solidFill>
-            <a:srgbClr val="FFFFFF"/>
-          </a:solidFill>
-          <a:ln w="25400" cap="flat">
-            <a:solidFill>
-              <a:schemeClr val="accent1"/>
-            </a:solidFill>
-            <a:prstDash val="solid"/>
-            <a:round/>
-          </a:ln>
-          <a:effectLst>
-            <a:outerShdw blurRad="50800" dist="20000" dir="5400000" rotWithShape="0">
-              <a:srgbClr val="000000">
-                <a:alpha val="42000"/>
-              </a:srgbClr>
-            </a:outerShdw>
-          </a:effectLst>
-          <a:sp3d/>
-        </p:spPr>
-        <p:style>
-          <a:lnRef idx="0">
-            <a:scrgbClr r="0" g="0" b="0"/>
-          </a:lnRef>
-          <a:fillRef idx="0">
-            <a:scrgbClr r="0" g="0" b="0"/>
-          </a:fillRef>
-          <a:effectRef idx="0">
-            <a:scrgbClr r="0" g="0" b="0"/>
-          </a:effectRef>
-          <a:fontRef idx="none"/>
-        </p:style>
-        <p:txBody>
-          <a:bodyPr rot="0" spcFirstLastPara="1" vertOverflow="overflow" horzOverflow="overflow" vert="horz" wrap="square" lIns="45719" tIns="45719" rIns="45719" bIns="45719" numCol="1" spcCol="38100" rtlCol="0" anchor="ctr">
-            <a:spAutoFit/>
-          </a:bodyPr>
-          <a:lstStyle/>
-          <a:p>
-            <a:pPr marL="0" marR="0" indent="0" algn="l" defTabSz="914400" rtl="0" fontAlgn="auto" latinLnBrk="0" hangingPunct="0">
-              <a:lnSpc>
-                <a:spcPct val="100000"/>
-              </a:lnSpc>
-              <a:spcBef>
-                <a:spcPts val="0"/>
-              </a:spcBef>
-              <a:spcAft>
-                <a:spcPts val="0"/>
-              </a:spcAft>
-              <a:buClrTx/>
-              <a:buSzTx/>
-              <a:buFontTx/>
-              <a:buNone/>
-              <a:tabLst/>
-            </a:pPr>
-            <a:endParaRPr kumimoji="0" lang="en-US" sz="1800" b="0" i="0" u="none" strike="noStrike" cap="none" spc="0" normalizeH="0" baseline="0">
-              <a:ln>
-                <a:noFill/>
-              </a:ln>
-              <a:solidFill>
-                <a:srgbClr val="000000"/>
-              </a:solidFill>
-              <a:effectLst/>
-              <a:uFillTx/>
-              <a:latin typeface="Century Schoolbook"/>
-              <a:ea typeface="Century Schoolbook"/>
-              <a:cs typeface="Century Schoolbook"/>
-              <a:sym typeface="Century Schoolbook"/>
-            </a:endParaRPr>
-          </a:p>
-        </p:txBody>
-      </p:sp>
-      <p:sp>
-        <p:nvSpPr>
-          <p:cNvPr id="10" name="Shape 225"/>
-          <p:cNvSpPr/>
-          <p:nvPr/>
-        </p:nvSpPr>
-        <p:spPr>
-          <a:xfrm>
-            <a:off x="6736106" y="4000800"/>
-            <a:ext cx="4127087" cy="1569660"/>
-          </a:xfrm>
-          <a:prstGeom prst="rect">
-            <a:avLst/>
-          </a:prstGeom>
-          <a:solidFill>
-            <a:srgbClr val="FAFAFA"/>
-          </a:solidFill>
-          <a:ln w="12700">
-            <a:solidFill>
-              <a:schemeClr val="accent1"/>
-            </a:solidFill>
-          </a:ln>
-          <a:extLst>
-            <a:ext uri="{C572A759-6A51-4108-AA02-DFA0A04FC94B}">
-              <ma14:wrappingTextBoxFlag xmlns="" xmlns:ma14="http://schemas.microsoft.com/office/mac/drawingml/2011/main" val="1"/>
+              <ma14:wrappingTextBoxFlag xmlns:ma14="http://schemas.microsoft.com/office/mac/drawingml/2011/main" xmlns="" val="1"/>
             </a:ext>
           </a:extLst>
         </p:spPr>

</xml_diff>

<commit_message>
minor formatting changes to presentation
</commit_message>
<xml_diff>
--- a/Doc/FinalPresentation.pptx
+++ b/Doc/FinalPresentation.pptx
@@ -1319,6 +1319,75 @@
 </p:notes>
 </file>
 
+<file path=ppt/notesSlides/notesSlide8.xml><?xml version="1.0" encoding="utf-8"?>
+<p:notes xmlns:a="http://schemas.openxmlformats.org/drawingml/2006/main" xmlns:r="http://schemas.openxmlformats.org/officeDocument/2006/relationships" xmlns:p="http://schemas.openxmlformats.org/presentationml/2006/main">
+  <p:cSld>
+    <p:spTree>
+      <p:nvGrpSpPr>
+        <p:cNvPr id="1" name=""/>
+        <p:cNvGrpSpPr/>
+        <p:nvPr/>
+      </p:nvGrpSpPr>
+      <p:grpSpPr>
+        <a:xfrm>
+          <a:off x="0" y="0"/>
+          <a:ext cx="0" cy="0"/>
+          <a:chOff x="0" y="0"/>
+          <a:chExt cx="0" cy="0"/>
+        </a:xfrm>
+      </p:grpSpPr>
+      <p:sp>
+        <p:nvSpPr>
+          <p:cNvPr id="2" name="Slide Image Placeholder 1"/>
+          <p:cNvSpPr>
+            <a:spLocks noGrp="1" noRot="1" noChangeAspect="1"/>
+          </p:cNvSpPr>
+          <p:nvPr>
+            <p:ph type="sldImg"/>
+          </p:nvPr>
+        </p:nvSpPr>
+        <p:spPr>
+          <a:xfrm>
+            <a:off x="381000" y="685800"/>
+            <a:ext cx="6096000" cy="3429000"/>
+          </a:xfrm>
+        </p:spPr>
+      </p:sp>
+      <p:sp>
+        <p:nvSpPr>
+          <p:cNvPr id="3" name="Notes Placeholder 2"/>
+          <p:cNvSpPr>
+            <a:spLocks noGrp="1"/>
+          </p:cNvSpPr>
+          <p:nvPr>
+            <p:ph type="body" idx="1"/>
+          </p:nvPr>
+        </p:nvSpPr>
+        <p:spPr/>
+        <p:txBody>
+          <a:bodyPr/>
+          <a:lstStyle/>
+          <a:p>
+            <a:r>
+              <a:rPr lang="en-US" dirty="0"/>
+              <a:t>Strategic pivot</a:t>
+            </a:r>
+          </a:p>
+        </p:txBody>
+      </p:sp>
+    </p:spTree>
+    <p:extLst>
+      <p:ext uri="{BB962C8B-B14F-4D97-AF65-F5344CB8AC3E}">
+        <p14:creationId xmlns:p14="http://schemas.microsoft.com/office/powerpoint/2010/main" val="2685361612"/>
+      </p:ext>
+    </p:extLst>
+  </p:cSld>
+  <p:clrMapOvr>
+    <a:masterClrMapping/>
+  </p:clrMapOvr>
+</p:notes>
+</file>
+
 <file path=ppt/slideLayouts/slideLayout1.xml><?xml version="1.0" encoding="utf-8"?>
 <p:sldLayout xmlns:a="http://schemas.openxmlformats.org/drawingml/2006/main" xmlns:r="http://schemas.openxmlformats.org/officeDocument/2006/relationships" xmlns:p="http://schemas.openxmlformats.org/presentationml/2006/main" showMasterSp="0" type="title">
   <p:cSld name="Title Slide">
@@ -4739,7 +4808,7 @@
           </a:ln>
           <a:extLst>
             <a:ext uri="{C572A759-6A51-4108-AA02-DFA0A04FC94B}">
-              <ma14:wrappingTextBoxFlag xmlns="" xmlns:ma14="http://schemas.microsoft.com/office/mac/drawingml/2011/main" val="1"/>
+              <ma14:wrappingTextBoxFlag xmlns:ma14="http://schemas.microsoft.com/office/mac/drawingml/2011/main" xmlns="" val="1"/>
             </a:ext>
           </a:extLst>
         </p:spPr>
@@ -4778,7 +4847,7 @@
           </a:ln>
           <a:extLst>
             <a:ext uri="{C572A759-6A51-4108-AA02-DFA0A04FC94B}">
-              <ma14:wrappingTextBoxFlag xmlns="" xmlns:ma14="http://schemas.microsoft.com/office/mac/drawingml/2011/main" val="1"/>
+              <ma14:wrappingTextBoxFlag xmlns:ma14="http://schemas.microsoft.com/office/mac/drawingml/2011/main" xmlns="" val="1"/>
             </a:ext>
           </a:extLst>
         </p:spPr>
@@ -5802,7 +5871,7 @@
           </a:ln>
           <a:extLst>
             <a:ext uri="{C572A759-6A51-4108-AA02-DFA0A04FC94B}">
-              <ma14:wrappingTextBoxFlag xmlns="" xmlns:ma14="http://schemas.microsoft.com/office/mac/drawingml/2011/main" val="1"/>
+              <ma14:wrappingTextBoxFlag xmlns:ma14="http://schemas.microsoft.com/office/mac/drawingml/2011/main" xmlns="" val="1"/>
             </a:ext>
           </a:extLst>
         </p:spPr>
@@ -6028,7 +6097,7 @@
           </a:ln>
           <a:extLst>
             <a:ext uri="{C572A759-6A51-4108-AA02-DFA0A04FC94B}">
-              <ma14:wrappingTextBoxFlag xmlns="" xmlns:ma14="http://schemas.microsoft.com/office/mac/drawingml/2011/main" val="1"/>
+              <ma14:wrappingTextBoxFlag xmlns:ma14="http://schemas.microsoft.com/office/mac/drawingml/2011/main" xmlns="" val="1"/>
             </a:ext>
           </a:extLst>
         </p:spPr>
@@ -6207,6 +6276,75 @@
             <a:r>
               <a:t>DEMO</a:t>
             </a:r>
+          </a:p>
+        </p:txBody>
+      </p:sp>
+      <p:sp>
+        <p:nvSpPr>
+          <p:cNvPr id="2" name="TextBox 1">
+            <a:hlinkClick r:id="rId3"/>
+          </p:cNvPr>
+          <p:cNvSpPr txBox="1"/>
+          <p:nvPr/>
+        </p:nvSpPr>
+        <p:spPr>
+          <a:xfrm>
+            <a:off x="3486518" y="3854269"/>
+            <a:ext cx="4902365" cy="369330"/>
+          </a:xfrm>
+          <a:prstGeom prst="rect">
+            <a:avLst/>
+          </a:prstGeom>
+          <a:noFill/>
+          <a:ln w="12700" cap="flat">
+            <a:noFill/>
+            <a:miter lim="400000"/>
+          </a:ln>
+          <a:effectLst/>
+          <a:sp3d/>
+        </p:spPr>
+        <p:style>
+          <a:lnRef idx="0">
+            <a:scrgbClr r="0" g="0" b="0"/>
+          </a:lnRef>
+          <a:fillRef idx="0">
+            <a:scrgbClr r="0" g="0" b="0"/>
+          </a:fillRef>
+          <a:effectRef idx="0">
+            <a:scrgbClr r="0" g="0" b="0"/>
+          </a:effectRef>
+          <a:fontRef idx="none"/>
+        </p:style>
+        <p:txBody>
+          <a:bodyPr rot="0" spcFirstLastPara="1" vertOverflow="overflow" horzOverflow="overflow" vert="horz" wrap="square" lIns="45719" tIns="45719" rIns="45719" bIns="45719" numCol="1" spcCol="38100" rtlCol="0" anchor="t">
+            <a:spAutoFit/>
+          </a:bodyPr>
+          <a:lstStyle/>
+          <a:p>
+            <a:r>
+              <a:rPr lang="en-US" dirty="0" err="1">
+                <a:latin typeface="Gill Sans MT" panose="020B0502020104020203" pitchFamily="34" charset="0"/>
+              </a:rPr>
+              <a:t>SearchingForSuccess</a:t>
+            </a:r>
+            <a:r>
+              <a:rPr lang="en-US" dirty="0">
+                <a:latin typeface="Gill Sans MT" panose="020B0502020104020203" pitchFamily="34" charset="0"/>
+              </a:rPr>
+              <a:t>/Submodule/Interface.ipynb</a:t>
+            </a:r>
+            <a:endParaRPr kumimoji="0" lang="en-US" sz="1800" b="0" i="0" u="none" strike="noStrike" cap="none" spc="0" normalizeH="0" baseline="0" dirty="0">
+              <a:ln>
+                <a:noFill/>
+              </a:ln>
+              <a:solidFill>
+                <a:srgbClr val="000000"/>
+              </a:solidFill>
+              <a:effectLst/>
+              <a:uFillTx/>
+              <a:latin typeface="Gill Sans MT" panose="020B0502020104020203" pitchFamily="34" charset="0"/>
+              <a:sym typeface="Century Schoolbook"/>
+            </a:endParaRPr>
           </a:p>
         </p:txBody>
       </p:sp>
@@ -6443,7 +6581,7 @@
           </a:ln>
           <a:extLst>
             <a:ext uri="{C572A759-6A51-4108-AA02-DFA0A04FC94B}">
-              <ma14:wrappingTextBoxFlag xmlns="" xmlns:ma14="http://schemas.microsoft.com/office/mac/drawingml/2011/main" val="1"/>
+              <ma14:wrappingTextBoxFlag xmlns:ma14="http://schemas.microsoft.com/office/mac/drawingml/2011/main" xmlns="" val="1"/>
             </a:ext>
           </a:extLst>
         </p:spPr>
@@ -6486,7 +6624,7 @@
           </a:ln>
           <a:extLst>
             <a:ext uri="{C572A759-6A51-4108-AA02-DFA0A04FC94B}">
-              <ma14:wrappingTextBoxFlag xmlns="" xmlns:ma14="http://schemas.microsoft.com/office/mac/drawingml/2011/main" val="1"/>
+              <ma14:wrappingTextBoxFlag xmlns:ma14="http://schemas.microsoft.com/office/mac/drawingml/2011/main" xmlns="" val="1"/>
             </a:ext>
           </a:extLst>
         </p:spPr>
@@ -7306,7 +7444,7 @@
               <a:effectLst/>
               <a:extLst>
                 <a:ext uri="{C572A759-6A51-4108-AA02-DFA0A04FC94B}">
-                  <ma14:wrappingTextBoxFlag xmlns="" xmlns:ma14="http://schemas.microsoft.com/office/mac/drawingml/2011/main" val="1"/>
+                  <ma14:wrappingTextBoxFlag xmlns:ma14="http://schemas.microsoft.com/office/mac/drawingml/2011/main" xmlns="" val="1"/>
                 </a:ext>
               </a:extLst>
             </p:spPr>
@@ -7354,7 +7492,7 @@
             <a:effectLst/>
             <a:extLst>
               <a:ext uri="{C572A759-6A51-4108-AA02-DFA0A04FC94B}">
-                <ma14:wrappingTextBoxFlag xmlns="" xmlns:ma14="http://schemas.microsoft.com/office/mac/drawingml/2011/main" val="1"/>
+                <ma14:wrappingTextBoxFlag xmlns:ma14="http://schemas.microsoft.com/office/mac/drawingml/2011/main" xmlns="" val="1"/>
               </a:ext>
             </a:extLst>
           </p:spPr>
@@ -7431,7 +7569,7 @@
             <a:effectLst/>
             <a:extLst>
               <a:ext uri="{C572A759-6A51-4108-AA02-DFA0A04FC94B}">
-                <ma14:wrappingTextBoxFlag xmlns="" xmlns:ma14="http://schemas.microsoft.com/office/mac/drawingml/2011/main" val="1"/>
+                <ma14:wrappingTextBoxFlag xmlns:ma14="http://schemas.microsoft.com/office/mac/drawingml/2011/main" xmlns="" val="1"/>
               </a:ext>
             </a:extLst>
           </p:spPr>
@@ -7808,7 +7946,7 @@
           </a:ln>
           <a:extLst>
             <a:ext uri="{C572A759-6A51-4108-AA02-DFA0A04FC94B}">
-              <ma14:wrappingTextBoxFlag xmlns="" xmlns:ma14="http://schemas.microsoft.com/office/mac/drawingml/2011/main" val="1"/>
+              <ma14:wrappingTextBoxFlag xmlns:ma14="http://schemas.microsoft.com/office/mac/drawingml/2011/main" xmlns="" val="1"/>
             </a:ext>
           </a:extLst>
         </p:spPr>
@@ -7854,7 +7992,7 @@
           </a:ln>
           <a:extLst>
             <a:ext uri="{C572A759-6A51-4108-AA02-DFA0A04FC94B}">
-              <ma14:wrappingTextBoxFlag xmlns="" xmlns:ma14="http://schemas.microsoft.com/office/mac/drawingml/2011/main" val="1"/>
+              <ma14:wrappingTextBoxFlag xmlns:ma14="http://schemas.microsoft.com/office/mac/drawingml/2011/main" xmlns="" val="1"/>
             </a:ext>
           </a:extLst>
         </p:spPr>
@@ -8410,7 +8548,7 @@
             <a:effectLst/>
             <a:extLst>
               <a:ext uri="{C572A759-6A51-4108-AA02-DFA0A04FC94B}">
-                <ma14:wrappingTextBoxFlag xmlns="" xmlns:ma14="http://schemas.microsoft.com/office/mac/drawingml/2011/main" val="1"/>
+                <ma14:wrappingTextBoxFlag xmlns:ma14="http://schemas.microsoft.com/office/mac/drawingml/2011/main" xmlns="" val="1"/>
               </a:ext>
             </a:extLst>
           </p:spPr>
@@ -8544,7 +8682,7 @@
             <a:effectLst/>
             <a:extLst>
               <a:ext uri="{C572A759-6A51-4108-AA02-DFA0A04FC94B}">
-                <ma14:wrappingTextBoxFlag xmlns="" xmlns:ma14="http://schemas.microsoft.com/office/mac/drawingml/2011/main" val="1"/>
+                <ma14:wrappingTextBoxFlag xmlns:ma14="http://schemas.microsoft.com/office/mac/drawingml/2011/main" xmlns="" val="1"/>
               </a:ext>
             </a:extLst>
           </p:spPr>
@@ -8678,7 +8816,7 @@
             <a:effectLst/>
             <a:extLst>
               <a:ext uri="{C572A759-6A51-4108-AA02-DFA0A04FC94B}">
-                <ma14:wrappingTextBoxFlag xmlns="" xmlns:ma14="http://schemas.microsoft.com/office/mac/drawingml/2011/main" val="1"/>
+                <ma14:wrappingTextBoxFlag xmlns:ma14="http://schemas.microsoft.com/office/mac/drawingml/2011/main" xmlns="" val="1"/>
               </a:ext>
             </a:extLst>
           </p:spPr>
@@ -8827,7 +8965,7 @@
             <a:effectLst/>
             <a:extLst>
               <a:ext uri="{C572A759-6A51-4108-AA02-DFA0A04FC94B}">
-                <ma14:wrappingTextBoxFlag xmlns="" xmlns:ma14="http://schemas.microsoft.com/office/mac/drawingml/2011/main" val="1"/>
+                <ma14:wrappingTextBoxFlag xmlns:ma14="http://schemas.microsoft.com/office/mac/drawingml/2011/main" xmlns="" val="1"/>
               </a:ext>
             </a:extLst>
           </p:spPr>
@@ -8976,7 +9114,7 @@
             <a:effectLst/>
             <a:extLst>
               <a:ext uri="{C572A759-6A51-4108-AA02-DFA0A04FC94B}">
-                <ma14:wrappingTextBoxFlag xmlns="" xmlns:ma14="http://schemas.microsoft.com/office/mac/drawingml/2011/main" val="1"/>
+                <ma14:wrappingTextBoxFlag xmlns:ma14="http://schemas.microsoft.com/office/mac/drawingml/2011/main" xmlns="" val="1"/>
               </a:ext>
             </a:extLst>
           </p:spPr>
@@ -9124,7 +9262,7 @@
             <a:effectLst/>
             <a:extLst>
               <a:ext uri="{C572A759-6A51-4108-AA02-DFA0A04FC94B}">
-                <ma14:wrappingTextBoxFlag xmlns="" xmlns:ma14="http://schemas.microsoft.com/office/mac/drawingml/2011/main" val="1"/>
+                <ma14:wrappingTextBoxFlag xmlns:ma14="http://schemas.microsoft.com/office/mac/drawingml/2011/main" xmlns="" val="1"/>
               </a:ext>
             </a:extLst>
           </p:spPr>
@@ -9644,7 +9782,7 @@
           </a:ln>
           <a:extLst>
             <a:ext uri="{C572A759-6A51-4108-AA02-DFA0A04FC94B}">
-              <ma14:wrappingTextBoxFlag xmlns="" xmlns:ma14="http://schemas.microsoft.com/office/mac/drawingml/2011/main" val="1"/>
+              <ma14:wrappingTextBoxFlag xmlns:ma14="http://schemas.microsoft.com/office/mac/drawingml/2011/main" xmlns="" val="1"/>
             </a:ext>
           </a:extLst>
         </p:spPr>
@@ -9788,7 +9926,7 @@
           </a:ln>
           <a:extLst>
             <a:ext uri="{C572A759-6A51-4108-AA02-DFA0A04FC94B}">
-              <ma14:wrappingTextBoxFlag xmlns="" xmlns:ma14="http://schemas.microsoft.com/office/mac/drawingml/2011/main" val="1"/>
+              <ma14:wrappingTextBoxFlag xmlns:ma14="http://schemas.microsoft.com/office/mac/drawingml/2011/main" xmlns="" val="1"/>
             </a:ext>
           </a:extLst>
         </p:spPr>
@@ -9809,15 +9947,7 @@
             </a:pPr>
             <a:r>
               <a:rPr lang="en-US" sz="3000" dirty="0"/>
-              <a:t>1. Get the </a:t>
-            </a:r>
-            <a:r>
-              <a:rPr lang="en-US" sz="3000" dirty="0"/>
-              <a:t>earnings </a:t>
-            </a:r>
-            <a:r>
-              <a:rPr lang="en-US" sz="3000" dirty="0"/>
-              <a:t>release date for each company from Yahoo finance</a:t>
+              <a:t>1. Get the earnings release date for each company from Yahoo finance</a:t>
             </a:r>
           </a:p>
           <a:p>
@@ -10100,29 +10230,331 @@
               <a:defRPr sz="3200" b="1"/>
             </a:pPr>
             <a:r>
-              <a:t>Control Logic – PredictionStockPrice Module</a:t>
-            </a:r>
-            <a:br/>
-            <a:endParaRPr/>
-          </a:p>
-        </p:txBody>
-      </p:sp>
-      <p:sp>
-        <p:nvSpPr>
-          <p:cNvPr id="4" name="Right Arrow 3"/>
+              <a:rPr dirty="0"/>
+              <a:t>Control Logic – Prediction</a:t>
+            </a:r>
+            <a:r>
+              <a:rPr lang="en-US" dirty="0"/>
+              <a:t> </a:t>
+            </a:r>
+            <a:r>
+              <a:rPr dirty="0"/>
+              <a:t>Stock</a:t>
+            </a:r>
+            <a:r>
+              <a:rPr lang="en-US" dirty="0"/>
+              <a:t> </a:t>
+            </a:r>
+            <a:r>
+              <a:rPr dirty="0"/>
+              <a:t>Price Module</a:t>
+            </a:r>
+            <a:br>
+              <a:rPr dirty="0"/>
+            </a:br>
+            <a:endParaRPr dirty="0"/>
+          </a:p>
+        </p:txBody>
+      </p:sp>
+      <p:sp>
+        <p:nvSpPr>
+          <p:cNvPr id="2" name="Rectangle 1"/>
           <p:cNvSpPr/>
           <p:nvPr/>
         </p:nvSpPr>
         <p:spPr>
           <a:xfrm>
-            <a:off x="5443374" y="4543313"/>
-            <a:ext cx="978408" cy="484632"/>
+            <a:off x="985192" y="1655314"/>
+            <a:ext cx="4231385" cy="1323439"/>
+          </a:xfrm>
+          <a:prstGeom prst="rect">
+            <a:avLst/>
+          </a:prstGeom>
+        </p:spPr>
+        <p:txBody>
+          <a:bodyPr wrap="square" lIns="91440">
+            <a:spAutoFit/>
+          </a:bodyPr>
+          <a:lstStyle/>
+          <a:p>
+            <a:pPr lvl="1" indent="0">
+              <a:defRPr sz="1600"/>
+            </a:pPr>
+            <a:r>
+              <a:rPr lang="en-US" sz="2000" b="1" dirty="0" err="1"/>
+              <a:t>feature_selection</a:t>
+            </a:r>
+            <a:r>
+              <a:rPr lang="en-US" sz="2000" dirty="0"/>
+              <a:t>()</a:t>
+            </a:r>
+          </a:p>
+          <a:p>
+            <a:pPr lvl="1" indent="285750">
+              <a:buFont typeface="Arial" panose="020B0604020202020204" pitchFamily="34" charset="0"/>
+              <a:buChar char="•"/>
+              <a:defRPr sz="1600"/>
+            </a:pPr>
+            <a:r>
+              <a:rPr lang="en-US" sz="2000" dirty="0"/>
+              <a:t>Get trend data for all Google</a:t>
+            </a:r>
+          </a:p>
+          <a:p>
+            <a:pPr lvl="1" indent="0">
+              <a:defRPr sz="1600"/>
+            </a:pPr>
+            <a:r>
+              <a:rPr lang="en-US" sz="2000" dirty="0"/>
+              <a:t>    Trend keywords</a:t>
+            </a:r>
+          </a:p>
+          <a:p>
+            <a:pPr lvl="1" indent="-285750">
+              <a:buFont typeface="Arial" panose="020B0604020202020204" pitchFamily="34" charset="0"/>
+              <a:buChar char="•"/>
+              <a:defRPr sz="1600"/>
+            </a:pPr>
+            <a:r>
+              <a:rPr lang="en-US" sz="2000" dirty="0"/>
+              <a:t>Get daily stock price data</a:t>
+            </a:r>
+          </a:p>
+        </p:txBody>
+      </p:sp>
+      <p:sp>
+        <p:nvSpPr>
+          <p:cNvPr id="6" name="Shape 225"/>
+          <p:cNvSpPr/>
+          <p:nvPr/>
+        </p:nvSpPr>
+        <p:spPr>
+          <a:xfrm>
+            <a:off x="6300512" y="1191306"/>
+            <a:ext cx="4602656" cy="2769989"/>
+          </a:xfrm>
+          <a:prstGeom prst="rect">
+            <a:avLst/>
+          </a:prstGeom>
+          <a:solidFill>
+            <a:srgbClr val="FAFAFA"/>
+          </a:solidFill>
+          <a:ln w="12700">
+            <a:solidFill>
+              <a:schemeClr val="accent1"/>
+            </a:solidFill>
+          </a:ln>
+          <a:extLst>
+            <a:ext uri="{C572A759-6A51-4108-AA02-DFA0A04FC94B}">
+              <ma14:wrappingTextBoxFlag xmlns:ma14="http://schemas.microsoft.com/office/mac/drawingml/2011/main" xmlns="" val="1"/>
+            </a:ext>
+          </a:extLst>
+        </p:spPr>
+        <p:txBody>
+          <a:bodyPr wrap="square" lIns="91440" tIns="91440" rIns="91440" bIns="91440">
+            <a:spAutoFit/>
+          </a:bodyPr>
+          <a:lstStyle/>
+          <a:p>
+            <a:pPr marL="457200" indent="-457200">
+              <a:buSzPct val="100000"/>
+              <a:buAutoNum type="arabicPeriod"/>
+              <a:defRPr sz="2400">
+                <a:latin typeface="Gill Sans MT"/>
+                <a:ea typeface="Gill Sans MT"/>
+                <a:cs typeface="Gill Sans MT"/>
+                <a:sym typeface="Gill Sans MT"/>
+              </a:defRPr>
+            </a:pPr>
+            <a:r>
+              <a:rPr lang="en-US" dirty="0"/>
+              <a:t>Generate the keyword list with the 5 keywords with high impact on Stock Price</a:t>
+            </a:r>
+          </a:p>
+          <a:p>
+            <a:pPr marL="457200" indent="-457200">
+              <a:buSzPct val="100000"/>
+              <a:buAutoNum type="arabicPeriod"/>
+              <a:defRPr sz="2400">
+                <a:latin typeface="Gill Sans MT"/>
+                <a:ea typeface="Gill Sans MT"/>
+                <a:cs typeface="Gill Sans MT"/>
+                <a:sym typeface="Gill Sans MT"/>
+              </a:defRPr>
+            </a:pPr>
+            <a:r>
+              <a:rPr lang="en-US" dirty="0"/>
+              <a:t>The keyword list is used by the ML model for prediction</a:t>
+            </a:r>
+          </a:p>
+          <a:p>
+            <a:pPr marL="457200" indent="-457200">
+              <a:buSzPct val="100000"/>
+              <a:buAutoNum type="arabicPeriod"/>
+              <a:defRPr sz="2400">
+                <a:latin typeface="Gill Sans MT"/>
+                <a:ea typeface="Gill Sans MT"/>
+                <a:cs typeface="Gill Sans MT"/>
+                <a:sym typeface="Gill Sans MT"/>
+              </a:defRPr>
+            </a:pPr>
+            <a:r>
+              <a:rPr lang="en-US" dirty="0"/>
+              <a:t>The keyword list is used by the plot function</a:t>
+            </a:r>
+          </a:p>
+        </p:txBody>
+      </p:sp>
+      <p:sp>
+        <p:nvSpPr>
+          <p:cNvPr id="3" name="Rectangle 2"/>
+          <p:cNvSpPr/>
+          <p:nvPr/>
+        </p:nvSpPr>
+        <p:spPr>
+          <a:xfrm>
+            <a:off x="869430" y="3662245"/>
+            <a:ext cx="4452078" cy="2246769"/>
+          </a:xfrm>
+          <a:prstGeom prst="rect">
+            <a:avLst/>
+          </a:prstGeom>
+        </p:spPr>
+        <p:txBody>
+          <a:bodyPr wrap="square">
+            <a:spAutoFit/>
+          </a:bodyPr>
+          <a:lstStyle/>
+          <a:p>
+            <a:r>
+              <a:rPr lang="en-US" sz="2000" b="1" dirty="0" err="1"/>
+              <a:t>prediction_model</a:t>
+            </a:r>
+            <a:r>
+              <a:rPr lang="en-US" sz="2000" dirty="0"/>
+              <a:t>:</a:t>
+            </a:r>
+          </a:p>
+          <a:p>
+            <a:pPr marL="342900" lvl="1" indent="-342900">
+              <a:buFont typeface="Arial" panose="020B0604020202020204" pitchFamily="34" charset="0"/>
+              <a:buChar char="•"/>
+            </a:pPr>
+            <a:r>
+              <a:rPr lang="en-US" sz="2000" dirty="0"/>
+              <a:t>Keywords identified by </a:t>
+            </a:r>
+            <a:r>
+              <a:rPr lang="en-US" sz="2000" dirty="0" err="1"/>
+              <a:t>feature_selection</a:t>
+            </a:r>
+            <a:r>
+              <a:rPr lang="en-US" sz="2000" dirty="0"/>
+              <a:t>()</a:t>
+            </a:r>
+          </a:p>
+          <a:p>
+            <a:pPr marL="342900" lvl="1" indent="-342900">
+              <a:buFont typeface="Arial" panose="020B0604020202020204" pitchFamily="34" charset="0"/>
+              <a:buChar char="•"/>
+            </a:pPr>
+            <a:r>
+              <a:rPr lang="en-US" sz="2000" dirty="0"/>
+              <a:t>Daily stock price data</a:t>
+            </a:r>
+          </a:p>
+          <a:p>
+            <a:pPr marL="342900" lvl="1" indent="-342900">
+              <a:buFont typeface="Arial" panose="020B0604020202020204" pitchFamily="34" charset="0"/>
+              <a:buChar char="•"/>
+            </a:pPr>
+            <a:r>
+              <a:rPr lang="en-US" sz="2000" dirty="0"/>
+              <a:t>Earnings Report date from </a:t>
+            </a:r>
+            <a:r>
+              <a:rPr lang="en-US" sz="2000" dirty="0" err="1"/>
+              <a:t>get_earnings_data</a:t>
+            </a:r>
+            <a:r>
+              <a:rPr lang="en-US" sz="2000" dirty="0"/>
+              <a:t>()</a:t>
+            </a:r>
+          </a:p>
+          <a:p>
+            <a:endParaRPr lang="en-US" sz="2000" dirty="0"/>
+          </a:p>
+        </p:txBody>
+      </p:sp>
+      <p:sp>
+        <p:nvSpPr>
+          <p:cNvPr id="10" name="Shape 225"/>
+          <p:cNvSpPr/>
+          <p:nvPr/>
+        </p:nvSpPr>
+        <p:spPr>
+          <a:xfrm>
+            <a:off x="6300512" y="4139298"/>
+            <a:ext cx="4582667" cy="1292662"/>
+          </a:xfrm>
+          <a:prstGeom prst="rect">
+            <a:avLst/>
+          </a:prstGeom>
+          <a:solidFill>
+            <a:srgbClr val="FAFAFA"/>
+          </a:solidFill>
+          <a:ln w="12700">
+            <a:solidFill>
+              <a:schemeClr val="accent1"/>
+            </a:solidFill>
+          </a:ln>
+          <a:extLst>
+            <a:ext uri="{C572A759-6A51-4108-AA02-DFA0A04FC94B}">
+              <ma14:wrappingTextBoxFlag xmlns:ma14="http://schemas.microsoft.com/office/mac/drawingml/2011/main" xmlns="" val="1"/>
+            </a:ext>
+          </a:extLst>
+        </p:spPr>
+        <p:txBody>
+          <a:bodyPr wrap="square" lIns="182880" tIns="91440" rIns="91440" bIns="91440">
+            <a:spAutoFit/>
+          </a:bodyPr>
+          <a:lstStyle/>
+          <a:p>
+            <a:pPr>
+              <a:buSzPct val="100000"/>
+              <a:defRPr sz="2400">
+                <a:latin typeface="Gill Sans MT"/>
+                <a:ea typeface="Gill Sans MT"/>
+                <a:cs typeface="Gill Sans MT"/>
+                <a:sym typeface="Gill Sans MT"/>
+              </a:defRPr>
+            </a:pPr>
+            <a:r>
+              <a:rPr lang="en-US" dirty="0"/>
+              <a:t>Likelihood the Stock Price will increase after the quarterly Earnings Report is released</a:t>
+            </a:r>
+          </a:p>
+        </p:txBody>
+      </p:sp>
+      <p:sp>
+        <p:nvSpPr>
+          <p:cNvPr id="12" name="Right Arrow 10"/>
+          <p:cNvSpPr/>
+          <p:nvPr/>
+        </p:nvSpPr>
+        <p:spPr>
+          <a:xfrm rot="522495">
+            <a:off x="3879995" y="3690805"/>
+            <a:ext cx="1821667" cy="540979"/>
           </a:xfrm>
           <a:prstGeom prst="rightArrow">
             <a:avLst/>
           </a:prstGeom>
           <a:solidFill>
-            <a:srgbClr val="FFFFFF"/>
+            <a:schemeClr val="accent1">
+              <a:lumMod val="40000"/>
+              <a:lumOff val="60000"/>
+            </a:schemeClr>
           </a:solidFill>
           <a:ln w="25400" cap="flat">
             <a:solidFill>
@@ -10193,258 +10625,23 @@
       </p:sp>
       <p:sp>
         <p:nvSpPr>
-          <p:cNvPr id="2" name="Rectangle 1"/>
+          <p:cNvPr id="13" name="Right Arrow 10"/>
           <p:cNvSpPr/>
           <p:nvPr/>
         </p:nvSpPr>
         <p:spPr>
-          <a:xfrm>
-            <a:off x="609599" y="1458788"/>
-            <a:ext cx="4606978" cy="1400383"/>
-          </a:xfrm>
-          <a:prstGeom prst="rect">
-            <a:avLst/>
-          </a:prstGeom>
-        </p:spPr>
-        <p:txBody>
-          <a:bodyPr wrap="square">
-            <a:spAutoFit/>
-          </a:bodyPr>
-          <a:lstStyle/>
-          <a:p>
-            <a:pPr marL="365760" lvl="1" indent="0">
-              <a:spcBef>
-                <a:spcPts val="300"/>
-              </a:spcBef>
-              <a:defRPr sz="1600"/>
-            </a:pPr>
-            <a:r>
-              <a:rPr lang="en-US" sz="2000" dirty="0" err="1"/>
-              <a:t>feature_selection</a:t>
-            </a:r>
-            <a:r>
-              <a:rPr lang="en-US" sz="2000" dirty="0"/>
-              <a:t>()</a:t>
-            </a:r>
-          </a:p>
-          <a:p>
-            <a:pPr marL="651510" lvl="1" indent="-285750">
-              <a:spcBef>
-                <a:spcPts val="300"/>
-              </a:spcBef>
-              <a:buFont typeface="Arial" panose="020B0604020202020204" pitchFamily="34" charset="0"/>
-              <a:buChar char="•"/>
-              <a:defRPr sz="1600"/>
-            </a:pPr>
-            <a:r>
-              <a:rPr lang="en-US" sz="2000" dirty="0"/>
-              <a:t>Get trend data for all </a:t>
-            </a:r>
-            <a:r>
-              <a:rPr lang="en-US" sz="2000" dirty="0"/>
-              <a:t>Google Trend </a:t>
-            </a:r>
-            <a:r>
-              <a:rPr lang="en-US" sz="2000" dirty="0"/>
-              <a:t>keywords</a:t>
-            </a:r>
-          </a:p>
-          <a:p>
-            <a:pPr marL="651510" lvl="1" indent="-285750">
-              <a:spcBef>
-                <a:spcPts val="300"/>
-              </a:spcBef>
-              <a:buFont typeface="Arial" panose="020B0604020202020204" pitchFamily="34" charset="0"/>
-              <a:buChar char="•"/>
-              <a:defRPr sz="1600"/>
-            </a:pPr>
-            <a:r>
-              <a:rPr lang="en-US" sz="2000" dirty="0"/>
-              <a:t>Get daily stock price data</a:t>
-            </a:r>
-          </a:p>
-        </p:txBody>
-      </p:sp>
-      <p:sp>
-        <p:nvSpPr>
-          <p:cNvPr id="6" name="Shape 225"/>
-          <p:cNvSpPr/>
-          <p:nvPr/>
-        </p:nvSpPr>
-        <p:spPr>
-          <a:xfrm>
-            <a:off x="6736106" y="1191306"/>
-            <a:ext cx="4167061" cy="2677656"/>
-          </a:xfrm>
-          <a:prstGeom prst="rect">
+          <a:xfrm rot="21163393">
+            <a:off x="3876467" y="1395869"/>
+            <a:ext cx="1821667" cy="540979"/>
+          </a:xfrm>
+          <a:prstGeom prst="rightArrow">
             <a:avLst/>
           </a:prstGeom>
           <a:solidFill>
-            <a:srgbClr val="FAFAFA"/>
-          </a:solidFill>
-          <a:ln w="12700">
-            <a:solidFill>
-              <a:schemeClr val="accent1"/>
-            </a:solidFill>
-          </a:ln>
-          <a:extLst>
-            <a:ext uri="{C572A759-6A51-4108-AA02-DFA0A04FC94B}">
-              <ma14:wrappingTextBoxFlag xmlns="" xmlns:ma14="http://schemas.microsoft.com/office/mac/drawingml/2011/main" val="1"/>
-            </a:ext>
-          </a:extLst>
-        </p:spPr>
-        <p:txBody>
-          <a:bodyPr wrap="square" lIns="45719" rIns="45719">
-            <a:spAutoFit/>
-          </a:bodyPr>
-          <a:lstStyle/>
-          <a:p>
-            <a:pPr marL="457200" indent="-457200">
-              <a:buSzPct val="100000"/>
-              <a:buAutoNum type="arabicPeriod"/>
-              <a:defRPr sz="2400">
-                <a:latin typeface="Gill Sans MT"/>
-                <a:ea typeface="Gill Sans MT"/>
-                <a:cs typeface="Gill Sans MT"/>
-                <a:sym typeface="Gill Sans MT"/>
-              </a:defRPr>
-            </a:pPr>
-            <a:r>
-              <a:rPr lang="en-US" dirty="0"/>
-              <a:t>Generate the keyword list with the 5 keywords with high impact on Stock Price</a:t>
-            </a:r>
-          </a:p>
-          <a:p>
-            <a:pPr marL="457200" indent="-457200">
-              <a:buSzPct val="100000"/>
-              <a:buAutoNum type="arabicPeriod"/>
-              <a:defRPr sz="2400">
-                <a:latin typeface="Gill Sans MT"/>
-                <a:ea typeface="Gill Sans MT"/>
-                <a:cs typeface="Gill Sans MT"/>
-                <a:sym typeface="Gill Sans MT"/>
-              </a:defRPr>
-            </a:pPr>
-            <a:r>
-              <a:rPr lang="en-US" dirty="0"/>
-              <a:t>The keyword list is used by the ML model for prediction</a:t>
-            </a:r>
-          </a:p>
-          <a:p>
-            <a:pPr marL="457200" indent="-457200">
-              <a:buSzPct val="100000"/>
-              <a:buAutoNum type="arabicPeriod"/>
-              <a:defRPr sz="2400">
-                <a:latin typeface="Gill Sans MT"/>
-                <a:ea typeface="Gill Sans MT"/>
-                <a:cs typeface="Gill Sans MT"/>
-                <a:sym typeface="Gill Sans MT"/>
-              </a:defRPr>
-            </a:pPr>
-            <a:r>
-              <a:rPr lang="en-US" dirty="0"/>
-              <a:t>The keyword list is used by the plot function</a:t>
-            </a:r>
-          </a:p>
-        </p:txBody>
-      </p:sp>
-      <p:sp>
-        <p:nvSpPr>
-          <p:cNvPr id="3" name="Rectangle 2"/>
-          <p:cNvSpPr/>
-          <p:nvPr/>
-        </p:nvSpPr>
-        <p:spPr>
-          <a:xfrm>
-            <a:off x="869430" y="3662245"/>
-            <a:ext cx="4452078" cy="2246769"/>
-          </a:xfrm>
-          <a:prstGeom prst="rect">
-            <a:avLst/>
-          </a:prstGeom>
-        </p:spPr>
-        <p:txBody>
-          <a:bodyPr wrap="square">
-            <a:spAutoFit/>
-          </a:bodyPr>
-          <a:lstStyle/>
-          <a:p>
-            <a:r>
-              <a:rPr lang="en-US" sz="2000" dirty="0" err="1"/>
-              <a:t>prediction_model</a:t>
-            </a:r>
-            <a:r>
-              <a:rPr lang="en-US" sz="2000" dirty="0"/>
-              <a:t>:</a:t>
-            </a:r>
-          </a:p>
-          <a:p>
-            <a:pPr marL="342900" lvl="1" indent="-342900">
-              <a:buFont typeface="Arial" panose="020B0604020202020204" pitchFamily="34" charset="0"/>
-              <a:buChar char="•"/>
-            </a:pPr>
-            <a:r>
-              <a:rPr lang="en-US" sz="2000" dirty="0"/>
-              <a:t>Keywords identified by </a:t>
-            </a:r>
-            <a:r>
-              <a:rPr lang="en-US" sz="2000" dirty="0" err="1"/>
-              <a:t>feature_selection</a:t>
-            </a:r>
-            <a:r>
-              <a:rPr lang="en-US" sz="2000" dirty="0"/>
-              <a:t>()</a:t>
-            </a:r>
-          </a:p>
-          <a:p>
-            <a:pPr marL="342900" lvl="1" indent="-342900">
-              <a:buFont typeface="Arial" panose="020B0604020202020204" pitchFamily="34" charset="0"/>
-              <a:buChar char="•"/>
-            </a:pPr>
-            <a:r>
-              <a:rPr lang="en-US" sz="2000" dirty="0"/>
-              <a:t>Daily stock price data</a:t>
-            </a:r>
-          </a:p>
-          <a:p>
-            <a:pPr marL="342900" lvl="1" indent="-342900">
-              <a:buFont typeface="Arial" panose="020B0604020202020204" pitchFamily="34" charset="0"/>
-              <a:buChar char="•"/>
-            </a:pPr>
-            <a:r>
-              <a:rPr lang="en-US" sz="2000" dirty="0"/>
-              <a:t>Earnings Report date from </a:t>
-            </a:r>
-            <a:r>
-              <a:rPr lang="en-US" sz="2000" dirty="0" err="1"/>
-              <a:t>get_earnings_data</a:t>
-            </a:r>
-            <a:r>
-              <a:rPr lang="en-US" sz="2000" dirty="0"/>
-              <a:t>()</a:t>
-            </a:r>
-          </a:p>
-          <a:p>
-            <a:endParaRPr lang="en-US" sz="2000" dirty="0"/>
-          </a:p>
-        </p:txBody>
-      </p:sp>
-      <p:sp>
-        <p:nvSpPr>
-          <p:cNvPr id="9" name="Right Arrow 8"/>
-          <p:cNvSpPr/>
-          <p:nvPr/>
-        </p:nvSpPr>
-        <p:spPr>
-          <a:xfrm>
-            <a:off x="5443374" y="2066763"/>
-            <a:ext cx="978408" cy="484632"/>
-          </a:xfrm>
-          <a:prstGeom prst="rightArrow">
-            <a:avLst/>
-          </a:prstGeom>
-          <a:solidFill>
-            <a:srgbClr val="FFFFFF"/>
+            <a:schemeClr val="accent1">
+              <a:lumMod val="40000"/>
+              <a:lumOff val="60000"/>
+            </a:schemeClr>
           </a:solidFill>
           <a:ln w="25400" cap="flat">
             <a:solidFill>
@@ -10513,69 +10710,6 @@
           </a:p>
         </p:txBody>
       </p:sp>
-      <p:sp>
-        <p:nvSpPr>
-          <p:cNvPr id="10" name="Shape 225"/>
-          <p:cNvSpPr/>
-          <p:nvPr/>
-        </p:nvSpPr>
-        <p:spPr>
-          <a:xfrm>
-            <a:off x="6736106" y="4000800"/>
-            <a:ext cx="4127087" cy="1569660"/>
-          </a:xfrm>
-          <a:prstGeom prst="rect">
-            <a:avLst/>
-          </a:prstGeom>
-          <a:solidFill>
-            <a:srgbClr val="FAFAFA"/>
-          </a:solidFill>
-          <a:ln w="12700">
-            <a:solidFill>
-              <a:schemeClr val="accent1"/>
-            </a:solidFill>
-          </a:ln>
-          <a:extLst>
-            <a:ext uri="{C572A759-6A51-4108-AA02-DFA0A04FC94B}">
-              <ma14:wrappingTextBoxFlag xmlns="" xmlns:ma14="http://schemas.microsoft.com/office/mac/drawingml/2011/main" val="1"/>
-            </a:ext>
-          </a:extLst>
-        </p:spPr>
-        <p:txBody>
-          <a:bodyPr wrap="square" lIns="45719" rIns="45719">
-            <a:spAutoFit/>
-          </a:bodyPr>
-          <a:lstStyle/>
-          <a:p>
-            <a:pPr>
-              <a:buSzPct val="100000"/>
-              <a:defRPr sz="2400">
-                <a:latin typeface="Gill Sans MT"/>
-                <a:ea typeface="Gill Sans MT"/>
-                <a:cs typeface="Gill Sans MT"/>
-                <a:sym typeface="Gill Sans MT"/>
-              </a:defRPr>
-            </a:pPr>
-            <a:r>
-              <a:rPr lang="en-US" dirty="0"/>
-              <a:t>Likelihood the Stock Price will increase after the quarterly Earnings Report is released</a:t>
-            </a:r>
-          </a:p>
-          <a:p>
-            <a:pPr marL="514350" indent="-514350">
-              <a:buSzPct val="100000"/>
-              <a:buAutoNum type="arabicPeriod"/>
-              <a:defRPr sz="2400">
-                <a:latin typeface="Gill Sans MT"/>
-                <a:ea typeface="Gill Sans MT"/>
-                <a:cs typeface="Gill Sans MT"/>
-                <a:sym typeface="Gill Sans MT"/>
-              </a:defRPr>
-            </a:pPr>
-            <a:endParaRPr dirty="0"/>
-          </a:p>
-        </p:txBody>
-      </p:sp>
     </p:spTree>
   </p:cSld>
   <p:clrMapOvr>
@@ -10614,7 +10748,7 @@
         </p:nvSpPr>
         <p:spPr>
           <a:xfrm>
-            <a:off x="609599" y="274638"/>
+            <a:off x="609599" y="144852"/>
             <a:ext cx="10911842" cy="1143001"/>
           </a:xfrm>
           <a:prstGeom prst="rect">
@@ -10672,7 +10806,7 @@
         </p:blipFill>
         <p:spPr>
           <a:xfrm>
-            <a:off x="207176" y="2728841"/>
+            <a:off x="260270" y="2372461"/>
             <a:ext cx="5504853" cy="3860211"/>
           </a:xfrm>
           <a:prstGeom prst="rect">
@@ -10700,7 +10834,7 @@
         </p:blipFill>
         <p:spPr>
           <a:xfrm>
-            <a:off x="5457198" y="2728841"/>
+            <a:off x="5834757" y="2372461"/>
             <a:ext cx="5778009" cy="3955780"/>
           </a:xfrm>
           <a:prstGeom prst="rect">
@@ -10733,7 +10867,7 @@
           <a:lstStyle/>
           <a:p>
             <a:r>
-              <a:rPr lang="en-US" sz="2000" dirty="0" err="1"/>
+              <a:rPr lang="en-US" sz="2000" b="1" dirty="0" err="1"/>
               <a:t>historical_data_plot</a:t>
             </a:r>
             <a:r>
@@ -10775,90 +10909,6 @@
               <a:buChar char="•"/>
             </a:pPr>
             <a:endParaRPr lang="en-US" sz="2000" dirty="0"/>
-          </a:p>
-        </p:txBody>
-      </p:sp>
-      <p:sp>
-        <p:nvSpPr>
-          <p:cNvPr id="9" name="Right Arrow 8"/>
-          <p:cNvSpPr/>
-          <p:nvPr/>
-        </p:nvSpPr>
-        <p:spPr>
-          <a:xfrm rot="5400000">
-            <a:off x="4725678" y="2308335"/>
-            <a:ext cx="978408" cy="484632"/>
-          </a:xfrm>
-          <a:prstGeom prst="rightArrow">
-            <a:avLst/>
-          </a:prstGeom>
-          <a:solidFill>
-            <a:srgbClr val="FFFFFF"/>
-          </a:solidFill>
-          <a:ln w="25400" cap="flat">
-            <a:solidFill>
-              <a:schemeClr val="accent1"/>
-            </a:solidFill>
-            <a:prstDash val="solid"/>
-            <a:round/>
-          </a:ln>
-          <a:effectLst>
-            <a:outerShdw blurRad="50800" dist="20000" dir="5400000" rotWithShape="0">
-              <a:srgbClr val="000000">
-                <a:alpha val="42000"/>
-              </a:srgbClr>
-            </a:outerShdw>
-          </a:effectLst>
-          <a:sp3d/>
-        </p:spPr>
-        <p:style>
-          <a:lnRef idx="0">
-            <a:scrgbClr r="0" g="0" b="0"/>
-          </a:lnRef>
-          <a:fillRef idx="0">
-            <a:scrgbClr r="0" g="0" b="0"/>
-          </a:fillRef>
-          <a:effectRef idx="0">
-            <a:scrgbClr r="0" g="0" b="0"/>
-          </a:effectRef>
-          <a:fontRef idx="none"/>
-        </p:style>
-        <p:txBody>
-          <a:bodyPr rot="0" spcFirstLastPara="1" vertOverflow="overflow" horzOverflow="overflow" vert="horz" wrap="square" lIns="45719" tIns="45719" rIns="45719" bIns="45719" numCol="1" spcCol="38100" rtlCol="0" anchor="ctr">
-            <a:spAutoFit/>
-          </a:bodyPr>
-          <a:lstStyle/>
-          <a:p>
-            <a:pPr marL="0" marR="0" indent="0" algn="l" defTabSz="914400" rtl="0" fontAlgn="auto" latinLnBrk="0" hangingPunct="0">
-              <a:lnSpc>
-                <a:spcPct val="100000"/>
-              </a:lnSpc>
-              <a:spcBef>
-                <a:spcPts val="0"/>
-              </a:spcBef>
-              <a:spcAft>
-                <a:spcPts val="0"/>
-              </a:spcAft>
-              <a:buClrTx/>
-              <a:buSzTx/>
-              <a:buFontTx/>
-              <a:buNone/>
-              <a:tabLst/>
-            </a:pPr>
-            <a:endParaRPr kumimoji="0" lang="en-US" sz="1800" b="0" i="0" u="none" strike="noStrike" cap="none" spc="0" normalizeH="0" baseline="0">
-              <a:ln>
-                <a:noFill/>
-              </a:ln>
-              <a:solidFill>
-                <a:srgbClr val="000000"/>
-              </a:solidFill>
-              <a:effectLst/>
-              <a:uFillTx/>
-              <a:latin typeface="Century Schoolbook"/>
-              <a:ea typeface="Century Schoolbook"/>
-              <a:cs typeface="Century Schoolbook"/>
-              <a:sym typeface="Century Schoolbook"/>
-            </a:endParaRPr>
           </a:p>
         </p:txBody>
       </p:sp>

</xml_diff>